<commit_message>
incluir Github Actions to DockerHub
</commit_message>
<xml_diff>
--- a/eda notebooks/Case Predictive Maintanance.pptx
+++ b/eda notebooks/Case Predictive Maintanance.pptx
@@ -5,7 +5,7 @@
     <p:sldMasterId id="2147483833" r:id="rId1"/>
   </p:sldMasterIdLst>
   <p:notesMasterIdLst>
-    <p:notesMasterId r:id="rId17"/>
+    <p:notesMasterId r:id="rId18"/>
   </p:notesMasterIdLst>
   <p:sldIdLst>
     <p:sldId id="256" r:id="rId2"/>
@@ -22,7 +22,8 @@
     <p:sldId id="262" r:id="rId13"/>
     <p:sldId id="275" r:id="rId14"/>
     <p:sldId id="272" r:id="rId15"/>
-    <p:sldId id="273" r:id="rId16"/>
+    <p:sldId id="276" r:id="rId16"/>
+    <p:sldId id="273" r:id="rId17"/>
   </p:sldIdLst>
   <p:sldSz cx="12192000" cy="6858000"/>
   <p:notesSz cx="6858000" cy="9144000"/>
@@ -121,6 +122,11 @@
       </a:defRPr>
     </a:lvl9pPr>
   </p:defaultTextStyle>
+  <p:extLst>
+    <p:ext uri="{EFAFB233-063F-42B5-8137-9DF3F51BA10A}">
+      <p15:sldGuideLst xmlns:p15="http://schemas.microsoft.com/office/powerpoint/2012/main"/>
+    </p:ext>
+  </p:extLst>
 </p:presentation>
 </file>
 
@@ -1619,6 +1625,753 @@
 </file>
 
 <file path=ppt/diagrams/colors3.xml><?xml version="1.0" encoding="utf-8"?>
+<dgm:colorsDef xmlns:dgm="http://schemas.openxmlformats.org/drawingml/2006/diagram" xmlns:a="http://schemas.openxmlformats.org/drawingml/2006/main" uniqueId="urn:microsoft.com/office/officeart/2005/8/colors/accent1_2">
+  <dgm:title val=""/>
+  <dgm:desc val=""/>
+  <dgm:catLst>
+    <dgm:cat type="accent1" pri="11200"/>
+  </dgm:catLst>
+  <dgm:styleLbl name="node0">
+    <dgm:fillClrLst meth="repeat">
+      <a:schemeClr val="accent1"/>
+    </dgm:fillClrLst>
+    <dgm:linClrLst meth="repeat">
+      <a:schemeClr val="lt1"/>
+    </dgm:linClrLst>
+    <dgm:effectClrLst/>
+    <dgm:txLinClrLst/>
+    <dgm:txFillClrLst/>
+    <dgm:txEffectClrLst/>
+  </dgm:styleLbl>
+  <dgm:styleLbl name="alignNode1">
+    <dgm:fillClrLst meth="repeat">
+      <a:schemeClr val="accent1"/>
+    </dgm:fillClrLst>
+    <dgm:linClrLst meth="repeat">
+      <a:schemeClr val="accent1"/>
+    </dgm:linClrLst>
+    <dgm:effectClrLst/>
+    <dgm:txLinClrLst/>
+    <dgm:txFillClrLst/>
+    <dgm:txEffectClrLst/>
+  </dgm:styleLbl>
+  <dgm:styleLbl name="node1">
+    <dgm:fillClrLst meth="repeat">
+      <a:schemeClr val="accent1"/>
+    </dgm:fillClrLst>
+    <dgm:linClrLst meth="repeat">
+      <a:schemeClr val="lt1"/>
+    </dgm:linClrLst>
+    <dgm:effectClrLst/>
+    <dgm:txLinClrLst/>
+    <dgm:txFillClrLst/>
+    <dgm:txEffectClrLst/>
+  </dgm:styleLbl>
+  <dgm:styleLbl name="lnNode1">
+    <dgm:fillClrLst meth="repeat">
+      <a:schemeClr val="accent1"/>
+    </dgm:fillClrLst>
+    <dgm:linClrLst meth="repeat">
+      <a:schemeClr val="lt1"/>
+    </dgm:linClrLst>
+    <dgm:effectClrLst/>
+    <dgm:txLinClrLst/>
+    <dgm:txFillClrLst/>
+    <dgm:txEffectClrLst/>
+  </dgm:styleLbl>
+  <dgm:styleLbl name="vennNode1">
+    <dgm:fillClrLst meth="repeat">
+      <a:schemeClr val="accent1">
+        <a:alpha val="50000"/>
+      </a:schemeClr>
+    </dgm:fillClrLst>
+    <dgm:linClrLst meth="repeat">
+      <a:schemeClr val="lt1"/>
+    </dgm:linClrLst>
+    <dgm:effectClrLst/>
+    <dgm:txLinClrLst/>
+    <dgm:txFillClrLst/>
+    <dgm:txEffectClrLst/>
+  </dgm:styleLbl>
+  <dgm:styleLbl name="node2">
+    <dgm:fillClrLst meth="repeat">
+      <a:schemeClr val="accent1"/>
+    </dgm:fillClrLst>
+    <dgm:linClrLst meth="repeat">
+      <a:schemeClr val="lt1"/>
+    </dgm:linClrLst>
+    <dgm:effectClrLst/>
+    <dgm:txLinClrLst/>
+    <dgm:txFillClrLst/>
+    <dgm:txEffectClrLst/>
+  </dgm:styleLbl>
+  <dgm:styleLbl name="node3">
+    <dgm:fillClrLst meth="repeat">
+      <a:schemeClr val="accent1"/>
+    </dgm:fillClrLst>
+    <dgm:linClrLst meth="repeat">
+      <a:schemeClr val="lt1"/>
+    </dgm:linClrLst>
+    <dgm:effectClrLst/>
+    <dgm:txLinClrLst/>
+    <dgm:txFillClrLst/>
+    <dgm:txEffectClrLst/>
+  </dgm:styleLbl>
+  <dgm:styleLbl name="node4">
+    <dgm:fillClrLst meth="repeat">
+      <a:schemeClr val="accent1"/>
+    </dgm:fillClrLst>
+    <dgm:linClrLst meth="repeat">
+      <a:schemeClr val="lt1"/>
+    </dgm:linClrLst>
+    <dgm:effectClrLst/>
+    <dgm:txLinClrLst/>
+    <dgm:txFillClrLst/>
+    <dgm:txEffectClrLst/>
+  </dgm:styleLbl>
+  <dgm:styleLbl name="fgImgPlace1">
+    <dgm:fillClrLst meth="repeat">
+      <a:schemeClr val="accent1">
+        <a:tint val="50000"/>
+      </a:schemeClr>
+    </dgm:fillClrLst>
+    <dgm:linClrLst meth="repeat">
+      <a:schemeClr val="lt1"/>
+    </dgm:linClrLst>
+    <dgm:effectClrLst/>
+    <dgm:txLinClrLst/>
+    <dgm:txFillClrLst meth="repeat">
+      <a:schemeClr val="lt1"/>
+    </dgm:txFillClrLst>
+    <dgm:txEffectClrLst/>
+  </dgm:styleLbl>
+  <dgm:styleLbl name="alignImgPlace1">
+    <dgm:fillClrLst meth="repeat">
+      <a:schemeClr val="accent1">
+        <a:tint val="50000"/>
+      </a:schemeClr>
+    </dgm:fillClrLst>
+    <dgm:linClrLst meth="repeat">
+      <a:schemeClr val="lt1"/>
+    </dgm:linClrLst>
+    <dgm:effectClrLst/>
+    <dgm:txLinClrLst/>
+    <dgm:txFillClrLst meth="repeat">
+      <a:schemeClr val="lt1"/>
+    </dgm:txFillClrLst>
+    <dgm:txEffectClrLst/>
+  </dgm:styleLbl>
+  <dgm:styleLbl name="bgImgPlace1">
+    <dgm:fillClrLst meth="repeat">
+      <a:schemeClr val="accent1">
+        <a:tint val="50000"/>
+      </a:schemeClr>
+    </dgm:fillClrLst>
+    <dgm:linClrLst meth="repeat">
+      <a:schemeClr val="lt1"/>
+    </dgm:linClrLst>
+    <dgm:effectClrLst/>
+    <dgm:txLinClrLst/>
+    <dgm:txFillClrLst meth="repeat">
+      <a:schemeClr val="lt1"/>
+    </dgm:txFillClrLst>
+    <dgm:txEffectClrLst/>
+  </dgm:styleLbl>
+  <dgm:styleLbl name="sibTrans2D1">
+    <dgm:fillClrLst meth="repeat">
+      <a:schemeClr val="accent1">
+        <a:tint val="60000"/>
+      </a:schemeClr>
+    </dgm:fillClrLst>
+    <dgm:linClrLst meth="repeat">
+      <a:schemeClr val="accent1">
+        <a:tint val="60000"/>
+      </a:schemeClr>
+    </dgm:linClrLst>
+    <dgm:effectClrLst/>
+    <dgm:txLinClrLst/>
+    <dgm:txFillClrLst/>
+    <dgm:txEffectClrLst/>
+  </dgm:styleLbl>
+  <dgm:styleLbl name="fgSibTrans2D1">
+    <dgm:fillClrLst meth="repeat">
+      <a:schemeClr val="accent1">
+        <a:tint val="60000"/>
+      </a:schemeClr>
+    </dgm:fillClrLst>
+    <dgm:linClrLst meth="repeat">
+      <a:schemeClr val="accent1">
+        <a:tint val="60000"/>
+      </a:schemeClr>
+    </dgm:linClrLst>
+    <dgm:effectClrLst/>
+    <dgm:txLinClrLst/>
+    <dgm:txFillClrLst/>
+    <dgm:txEffectClrLst/>
+  </dgm:styleLbl>
+  <dgm:styleLbl name="bgSibTrans2D1">
+    <dgm:fillClrLst meth="repeat">
+      <a:schemeClr val="accent1">
+        <a:tint val="60000"/>
+      </a:schemeClr>
+    </dgm:fillClrLst>
+    <dgm:linClrLst meth="repeat">
+      <a:schemeClr val="accent1">
+        <a:tint val="60000"/>
+      </a:schemeClr>
+    </dgm:linClrLst>
+    <dgm:effectClrLst/>
+    <dgm:txLinClrLst/>
+    <dgm:txFillClrLst/>
+    <dgm:txEffectClrLst/>
+  </dgm:styleLbl>
+  <dgm:styleLbl name="sibTrans1D1">
+    <dgm:fillClrLst meth="repeat">
+      <a:schemeClr val="accent1"/>
+    </dgm:fillClrLst>
+    <dgm:linClrLst meth="repeat">
+      <a:schemeClr val="accent1"/>
+    </dgm:linClrLst>
+    <dgm:effectClrLst/>
+    <dgm:txLinClrLst/>
+    <dgm:txFillClrLst meth="repeat">
+      <a:schemeClr val="tx1"/>
+    </dgm:txFillClrLst>
+    <dgm:txEffectClrLst/>
+  </dgm:styleLbl>
+  <dgm:styleLbl name="callout">
+    <dgm:fillClrLst meth="repeat">
+      <a:schemeClr val="accent1"/>
+    </dgm:fillClrLst>
+    <dgm:linClrLst meth="repeat">
+      <a:schemeClr val="accent1">
+        <a:tint val="50000"/>
+      </a:schemeClr>
+    </dgm:linClrLst>
+    <dgm:effectClrLst/>
+    <dgm:txLinClrLst/>
+    <dgm:txFillClrLst meth="repeat">
+      <a:schemeClr val="tx1"/>
+    </dgm:txFillClrLst>
+    <dgm:txEffectClrLst/>
+  </dgm:styleLbl>
+  <dgm:styleLbl name="asst0">
+    <dgm:fillClrLst meth="repeat">
+      <a:schemeClr val="accent1"/>
+    </dgm:fillClrLst>
+    <dgm:linClrLst meth="repeat">
+      <a:schemeClr val="lt1"/>
+    </dgm:linClrLst>
+    <dgm:effectClrLst/>
+    <dgm:txLinClrLst/>
+    <dgm:txFillClrLst/>
+    <dgm:txEffectClrLst/>
+  </dgm:styleLbl>
+  <dgm:styleLbl name="asst1">
+    <dgm:fillClrLst meth="repeat">
+      <a:schemeClr val="accent1"/>
+    </dgm:fillClrLst>
+    <dgm:linClrLst meth="repeat">
+      <a:schemeClr val="lt1"/>
+    </dgm:linClrLst>
+    <dgm:effectClrLst/>
+    <dgm:txLinClrLst/>
+    <dgm:txFillClrLst/>
+    <dgm:txEffectClrLst/>
+  </dgm:styleLbl>
+  <dgm:styleLbl name="asst2">
+    <dgm:fillClrLst meth="repeat">
+      <a:schemeClr val="accent1"/>
+    </dgm:fillClrLst>
+    <dgm:linClrLst meth="repeat">
+      <a:schemeClr val="lt1"/>
+    </dgm:linClrLst>
+    <dgm:effectClrLst/>
+    <dgm:txLinClrLst/>
+    <dgm:txFillClrLst/>
+    <dgm:txEffectClrLst/>
+  </dgm:styleLbl>
+  <dgm:styleLbl name="asst3">
+    <dgm:fillClrLst meth="repeat">
+      <a:schemeClr val="accent1"/>
+    </dgm:fillClrLst>
+    <dgm:linClrLst meth="repeat">
+      <a:schemeClr val="lt1"/>
+    </dgm:linClrLst>
+    <dgm:effectClrLst/>
+    <dgm:txLinClrLst/>
+    <dgm:txFillClrLst/>
+    <dgm:txEffectClrLst/>
+  </dgm:styleLbl>
+  <dgm:styleLbl name="asst4">
+    <dgm:fillClrLst meth="repeat">
+      <a:schemeClr val="accent1"/>
+    </dgm:fillClrLst>
+    <dgm:linClrLst meth="repeat">
+      <a:schemeClr val="lt1"/>
+    </dgm:linClrLst>
+    <dgm:effectClrLst/>
+    <dgm:txLinClrLst/>
+    <dgm:txFillClrLst/>
+    <dgm:txEffectClrLst/>
+  </dgm:styleLbl>
+  <dgm:styleLbl name="parChTrans2D1">
+    <dgm:fillClrLst meth="repeat">
+      <a:schemeClr val="accent1">
+        <a:tint val="60000"/>
+      </a:schemeClr>
+    </dgm:fillClrLst>
+    <dgm:linClrLst meth="repeat">
+      <a:schemeClr val="accent1">
+        <a:tint val="60000"/>
+      </a:schemeClr>
+    </dgm:linClrLst>
+    <dgm:effectClrLst/>
+    <dgm:txLinClrLst/>
+    <dgm:txFillClrLst meth="repeat">
+      <a:schemeClr val="lt1"/>
+    </dgm:txFillClrLst>
+    <dgm:txEffectClrLst/>
+  </dgm:styleLbl>
+  <dgm:styleLbl name="parChTrans2D2">
+    <dgm:fillClrLst meth="repeat">
+      <a:schemeClr val="accent1"/>
+    </dgm:fillClrLst>
+    <dgm:linClrLst meth="repeat">
+      <a:schemeClr val="accent1"/>
+    </dgm:linClrLst>
+    <dgm:effectClrLst/>
+    <dgm:txLinClrLst/>
+    <dgm:txFillClrLst meth="repeat">
+      <a:schemeClr val="lt1"/>
+    </dgm:txFillClrLst>
+    <dgm:txEffectClrLst/>
+  </dgm:styleLbl>
+  <dgm:styleLbl name="parChTrans2D3">
+    <dgm:fillClrLst meth="repeat">
+      <a:schemeClr val="accent1"/>
+    </dgm:fillClrLst>
+    <dgm:linClrLst meth="repeat">
+      <a:schemeClr val="accent1"/>
+    </dgm:linClrLst>
+    <dgm:effectClrLst/>
+    <dgm:txLinClrLst/>
+    <dgm:txFillClrLst meth="repeat">
+      <a:schemeClr val="lt1"/>
+    </dgm:txFillClrLst>
+    <dgm:txEffectClrLst/>
+  </dgm:styleLbl>
+  <dgm:styleLbl name="parChTrans2D4">
+    <dgm:fillClrLst meth="repeat">
+      <a:schemeClr val="accent1"/>
+    </dgm:fillClrLst>
+    <dgm:linClrLst meth="repeat">
+      <a:schemeClr val="accent1"/>
+    </dgm:linClrLst>
+    <dgm:effectClrLst/>
+    <dgm:txLinClrLst/>
+    <dgm:txFillClrLst meth="repeat">
+      <a:schemeClr val="lt1"/>
+    </dgm:txFillClrLst>
+    <dgm:txEffectClrLst/>
+  </dgm:styleLbl>
+  <dgm:styleLbl name="parChTrans1D1">
+    <dgm:fillClrLst meth="repeat">
+      <a:schemeClr val="accent1"/>
+    </dgm:fillClrLst>
+    <dgm:linClrLst meth="repeat">
+      <a:schemeClr val="accent1">
+        <a:shade val="60000"/>
+      </a:schemeClr>
+    </dgm:linClrLst>
+    <dgm:effectClrLst/>
+    <dgm:txLinClrLst/>
+    <dgm:txFillClrLst meth="repeat">
+      <a:schemeClr val="tx1"/>
+    </dgm:txFillClrLst>
+    <dgm:txEffectClrLst/>
+  </dgm:styleLbl>
+  <dgm:styleLbl name="parChTrans1D2">
+    <dgm:fillClrLst meth="repeat">
+      <a:schemeClr val="accent1"/>
+    </dgm:fillClrLst>
+    <dgm:linClrLst meth="repeat">
+      <a:schemeClr val="accent1">
+        <a:shade val="60000"/>
+      </a:schemeClr>
+    </dgm:linClrLst>
+    <dgm:effectClrLst/>
+    <dgm:txLinClrLst/>
+    <dgm:txFillClrLst meth="repeat">
+      <a:schemeClr val="tx1"/>
+    </dgm:txFillClrLst>
+    <dgm:txEffectClrLst/>
+  </dgm:styleLbl>
+  <dgm:styleLbl name="parChTrans1D3">
+    <dgm:fillClrLst meth="repeat">
+      <a:schemeClr val="accent1"/>
+    </dgm:fillClrLst>
+    <dgm:linClrLst meth="repeat">
+      <a:schemeClr val="accent1">
+        <a:shade val="80000"/>
+      </a:schemeClr>
+    </dgm:linClrLst>
+    <dgm:effectClrLst/>
+    <dgm:txLinClrLst/>
+    <dgm:txFillClrLst meth="repeat">
+      <a:schemeClr val="tx1"/>
+    </dgm:txFillClrLst>
+    <dgm:txEffectClrLst/>
+  </dgm:styleLbl>
+  <dgm:styleLbl name="parChTrans1D4">
+    <dgm:fillClrLst meth="repeat">
+      <a:schemeClr val="accent1"/>
+    </dgm:fillClrLst>
+    <dgm:linClrLst meth="repeat">
+      <a:schemeClr val="accent1">
+        <a:shade val="80000"/>
+      </a:schemeClr>
+    </dgm:linClrLst>
+    <dgm:effectClrLst/>
+    <dgm:txLinClrLst/>
+    <dgm:txFillClrLst meth="repeat">
+      <a:schemeClr val="tx1"/>
+    </dgm:txFillClrLst>
+    <dgm:txEffectClrLst/>
+  </dgm:styleLbl>
+  <dgm:styleLbl name="fgAcc1">
+    <dgm:fillClrLst meth="repeat">
+      <a:schemeClr val="lt1">
+        <a:alpha val="90000"/>
+      </a:schemeClr>
+    </dgm:fillClrLst>
+    <dgm:linClrLst meth="repeat">
+      <a:schemeClr val="accent1"/>
+    </dgm:linClrLst>
+    <dgm:effectClrLst/>
+    <dgm:txLinClrLst/>
+    <dgm:txFillClrLst meth="repeat">
+      <a:schemeClr val="dk1"/>
+    </dgm:txFillClrLst>
+    <dgm:txEffectClrLst/>
+  </dgm:styleLbl>
+  <dgm:styleLbl name="conFgAcc1">
+    <dgm:fillClrLst meth="repeat">
+      <a:schemeClr val="lt1">
+        <a:alpha val="90000"/>
+      </a:schemeClr>
+    </dgm:fillClrLst>
+    <dgm:linClrLst meth="repeat">
+      <a:schemeClr val="accent1"/>
+    </dgm:linClrLst>
+    <dgm:effectClrLst/>
+    <dgm:txLinClrLst/>
+    <dgm:txFillClrLst meth="repeat">
+      <a:schemeClr val="dk1"/>
+    </dgm:txFillClrLst>
+    <dgm:txEffectClrLst/>
+  </dgm:styleLbl>
+  <dgm:styleLbl name="alignAcc1">
+    <dgm:fillClrLst meth="repeat">
+      <a:schemeClr val="lt1">
+        <a:alpha val="90000"/>
+      </a:schemeClr>
+    </dgm:fillClrLst>
+    <dgm:linClrLst meth="repeat">
+      <a:schemeClr val="accent1"/>
+    </dgm:linClrLst>
+    <dgm:effectClrLst/>
+    <dgm:txLinClrLst/>
+    <dgm:txFillClrLst meth="repeat">
+      <a:schemeClr val="dk1"/>
+    </dgm:txFillClrLst>
+    <dgm:txEffectClrLst/>
+  </dgm:styleLbl>
+  <dgm:styleLbl name="trAlignAcc1">
+    <dgm:fillClrLst meth="repeat">
+      <a:schemeClr val="lt1">
+        <a:alpha val="40000"/>
+      </a:schemeClr>
+    </dgm:fillClrLst>
+    <dgm:linClrLst meth="repeat">
+      <a:schemeClr val="accent1"/>
+    </dgm:linClrLst>
+    <dgm:effectClrLst/>
+    <dgm:txLinClrLst/>
+    <dgm:txFillClrLst meth="repeat">
+      <a:schemeClr val="dk1"/>
+    </dgm:txFillClrLst>
+    <dgm:txEffectClrLst/>
+  </dgm:styleLbl>
+  <dgm:styleLbl name="bgAcc1">
+    <dgm:fillClrLst meth="repeat">
+      <a:schemeClr val="lt1">
+        <a:alpha val="90000"/>
+      </a:schemeClr>
+    </dgm:fillClrLst>
+    <dgm:linClrLst meth="repeat">
+      <a:schemeClr val="accent1"/>
+    </dgm:linClrLst>
+    <dgm:effectClrLst/>
+    <dgm:txLinClrLst/>
+    <dgm:txFillClrLst meth="repeat">
+      <a:schemeClr val="dk1"/>
+    </dgm:txFillClrLst>
+    <dgm:txEffectClrLst/>
+  </dgm:styleLbl>
+  <dgm:styleLbl name="solidFgAcc1">
+    <dgm:fillClrLst meth="repeat">
+      <a:schemeClr val="lt1"/>
+    </dgm:fillClrLst>
+    <dgm:linClrLst meth="repeat">
+      <a:schemeClr val="accent1"/>
+    </dgm:linClrLst>
+    <dgm:effectClrLst/>
+    <dgm:txLinClrLst/>
+    <dgm:txFillClrLst meth="repeat">
+      <a:schemeClr val="dk1"/>
+    </dgm:txFillClrLst>
+    <dgm:txEffectClrLst/>
+  </dgm:styleLbl>
+  <dgm:styleLbl name="solidAlignAcc1">
+    <dgm:fillClrLst meth="repeat">
+      <a:schemeClr val="lt1"/>
+    </dgm:fillClrLst>
+    <dgm:linClrLst meth="repeat">
+      <a:schemeClr val="accent1"/>
+    </dgm:linClrLst>
+    <dgm:effectClrLst/>
+    <dgm:txLinClrLst/>
+    <dgm:txFillClrLst meth="repeat">
+      <a:schemeClr val="dk1"/>
+    </dgm:txFillClrLst>
+    <dgm:txEffectClrLst/>
+  </dgm:styleLbl>
+  <dgm:styleLbl name="solidBgAcc1">
+    <dgm:fillClrLst meth="repeat">
+      <a:schemeClr val="lt1"/>
+    </dgm:fillClrLst>
+    <dgm:linClrLst meth="repeat">
+      <a:schemeClr val="accent1"/>
+    </dgm:linClrLst>
+    <dgm:effectClrLst/>
+    <dgm:txLinClrLst/>
+    <dgm:txFillClrLst meth="repeat">
+      <a:schemeClr val="dk1"/>
+    </dgm:txFillClrLst>
+    <dgm:txEffectClrLst/>
+  </dgm:styleLbl>
+  <dgm:styleLbl name="fgAccFollowNode1">
+    <dgm:fillClrLst meth="repeat">
+      <a:schemeClr val="accent1">
+        <a:alpha val="90000"/>
+        <a:tint val="40000"/>
+      </a:schemeClr>
+    </dgm:fillClrLst>
+    <dgm:linClrLst meth="repeat">
+      <a:schemeClr val="accent1">
+        <a:alpha val="90000"/>
+        <a:tint val="40000"/>
+      </a:schemeClr>
+    </dgm:linClrLst>
+    <dgm:effectClrLst/>
+    <dgm:txLinClrLst/>
+    <dgm:txFillClrLst meth="repeat">
+      <a:schemeClr val="dk1"/>
+    </dgm:txFillClrLst>
+    <dgm:txEffectClrLst/>
+  </dgm:styleLbl>
+  <dgm:styleLbl name="alignAccFollowNode1">
+    <dgm:fillClrLst meth="repeat">
+      <a:schemeClr val="accent1">
+        <a:alpha val="90000"/>
+        <a:tint val="40000"/>
+      </a:schemeClr>
+    </dgm:fillClrLst>
+    <dgm:linClrLst meth="repeat">
+      <a:schemeClr val="accent1">
+        <a:alpha val="90000"/>
+        <a:tint val="40000"/>
+      </a:schemeClr>
+    </dgm:linClrLst>
+    <dgm:effectClrLst/>
+    <dgm:txLinClrLst/>
+    <dgm:txFillClrLst meth="repeat">
+      <a:schemeClr val="dk1"/>
+    </dgm:txFillClrLst>
+    <dgm:txEffectClrLst/>
+  </dgm:styleLbl>
+  <dgm:styleLbl name="bgAccFollowNode1">
+    <dgm:fillClrLst meth="repeat">
+      <a:schemeClr val="accent1">
+        <a:alpha val="90000"/>
+        <a:tint val="40000"/>
+      </a:schemeClr>
+    </dgm:fillClrLst>
+    <dgm:linClrLst meth="repeat">
+      <a:schemeClr val="accent1">
+        <a:alpha val="90000"/>
+        <a:tint val="40000"/>
+      </a:schemeClr>
+    </dgm:linClrLst>
+    <dgm:effectClrLst/>
+    <dgm:txLinClrLst/>
+    <dgm:txFillClrLst meth="repeat">
+      <a:schemeClr val="dk1"/>
+    </dgm:txFillClrLst>
+    <dgm:txEffectClrLst/>
+  </dgm:styleLbl>
+  <dgm:styleLbl name="fgAcc0">
+    <dgm:fillClrLst meth="repeat">
+      <a:schemeClr val="lt1">
+        <a:alpha val="90000"/>
+      </a:schemeClr>
+    </dgm:fillClrLst>
+    <dgm:linClrLst meth="repeat">
+      <a:schemeClr val="accent1"/>
+    </dgm:linClrLst>
+    <dgm:effectClrLst/>
+    <dgm:txLinClrLst/>
+    <dgm:txFillClrLst meth="repeat">
+      <a:schemeClr val="dk1"/>
+    </dgm:txFillClrLst>
+    <dgm:txEffectClrLst/>
+  </dgm:styleLbl>
+  <dgm:styleLbl name="fgAcc2">
+    <dgm:fillClrLst meth="repeat">
+      <a:schemeClr val="lt1">
+        <a:alpha val="90000"/>
+      </a:schemeClr>
+    </dgm:fillClrLst>
+    <dgm:linClrLst meth="repeat">
+      <a:schemeClr val="accent1"/>
+    </dgm:linClrLst>
+    <dgm:effectClrLst/>
+    <dgm:txLinClrLst/>
+    <dgm:txFillClrLst meth="repeat">
+      <a:schemeClr val="dk1"/>
+    </dgm:txFillClrLst>
+    <dgm:txEffectClrLst/>
+  </dgm:styleLbl>
+  <dgm:styleLbl name="fgAcc3">
+    <dgm:fillClrLst meth="repeat">
+      <a:schemeClr val="lt1">
+        <a:alpha val="90000"/>
+      </a:schemeClr>
+    </dgm:fillClrLst>
+    <dgm:linClrLst meth="repeat">
+      <a:schemeClr val="accent1"/>
+    </dgm:linClrLst>
+    <dgm:effectClrLst/>
+    <dgm:txLinClrLst/>
+    <dgm:txFillClrLst meth="repeat">
+      <a:schemeClr val="dk1"/>
+    </dgm:txFillClrLst>
+    <dgm:txEffectClrLst/>
+  </dgm:styleLbl>
+  <dgm:styleLbl name="fgAcc4">
+    <dgm:fillClrLst meth="repeat">
+      <a:schemeClr val="lt1">
+        <a:alpha val="90000"/>
+      </a:schemeClr>
+    </dgm:fillClrLst>
+    <dgm:linClrLst meth="repeat">
+      <a:schemeClr val="accent1"/>
+    </dgm:linClrLst>
+    <dgm:effectClrLst/>
+    <dgm:txLinClrLst/>
+    <dgm:txFillClrLst meth="repeat">
+      <a:schemeClr val="dk1"/>
+    </dgm:txFillClrLst>
+    <dgm:txEffectClrLst/>
+  </dgm:styleLbl>
+  <dgm:styleLbl name="bgShp">
+    <dgm:fillClrLst meth="repeat">
+      <a:schemeClr val="accent1">
+        <a:tint val="40000"/>
+      </a:schemeClr>
+    </dgm:fillClrLst>
+    <dgm:linClrLst meth="repeat">
+      <a:schemeClr val="accent1"/>
+    </dgm:linClrLst>
+    <dgm:effectClrLst/>
+    <dgm:txLinClrLst/>
+    <dgm:txFillClrLst meth="repeat">
+      <a:schemeClr val="dk1"/>
+    </dgm:txFillClrLst>
+    <dgm:txEffectClrLst/>
+  </dgm:styleLbl>
+  <dgm:styleLbl name="dkBgShp">
+    <dgm:fillClrLst meth="repeat">
+      <a:schemeClr val="accent1">
+        <a:shade val="80000"/>
+      </a:schemeClr>
+    </dgm:fillClrLst>
+    <dgm:linClrLst meth="repeat">
+      <a:schemeClr val="accent1"/>
+    </dgm:linClrLst>
+    <dgm:effectClrLst/>
+    <dgm:txLinClrLst/>
+    <dgm:txFillClrLst meth="repeat">
+      <a:schemeClr val="lt1"/>
+    </dgm:txFillClrLst>
+    <dgm:txEffectClrLst/>
+  </dgm:styleLbl>
+  <dgm:styleLbl name="trBgShp">
+    <dgm:fillClrLst meth="repeat">
+      <a:schemeClr val="accent1">
+        <a:tint val="50000"/>
+        <a:alpha val="40000"/>
+      </a:schemeClr>
+    </dgm:fillClrLst>
+    <dgm:linClrLst meth="repeat">
+      <a:schemeClr val="accent1"/>
+    </dgm:linClrLst>
+    <dgm:effectClrLst/>
+    <dgm:txLinClrLst/>
+    <dgm:txFillClrLst meth="repeat">
+      <a:schemeClr val="lt1"/>
+    </dgm:txFillClrLst>
+    <dgm:txEffectClrLst/>
+  </dgm:styleLbl>
+  <dgm:styleLbl name="fgShp">
+    <dgm:fillClrLst meth="repeat">
+      <a:schemeClr val="accent1">
+        <a:tint val="60000"/>
+      </a:schemeClr>
+    </dgm:fillClrLst>
+    <dgm:linClrLst meth="repeat">
+      <a:schemeClr val="lt1"/>
+    </dgm:linClrLst>
+    <dgm:effectClrLst/>
+    <dgm:txLinClrLst/>
+    <dgm:txFillClrLst meth="repeat">
+      <a:schemeClr val="dk1"/>
+    </dgm:txFillClrLst>
+    <dgm:txEffectClrLst/>
+  </dgm:styleLbl>
+  <dgm:styleLbl name="revTx">
+    <dgm:fillClrLst meth="repeat">
+      <a:schemeClr val="lt1">
+        <a:alpha val="0"/>
+      </a:schemeClr>
+    </dgm:fillClrLst>
+    <dgm:linClrLst meth="repeat">
+      <a:schemeClr val="dk1">
+        <a:alpha val="0"/>
+      </a:schemeClr>
+    </dgm:linClrLst>
+    <dgm:effectClrLst/>
+    <dgm:txLinClrLst/>
+    <dgm:txFillClrLst meth="repeat">
+      <a:schemeClr val="tx1"/>
+    </dgm:txFillClrLst>
+    <dgm:txEffectClrLst/>
+  </dgm:styleLbl>
+</dgm:colorsDef>
+</file>
+
+<file path=ppt/diagrams/colors4.xml><?xml version="1.0" encoding="utf-8"?>
 <dgm:colorsDef xmlns:dgm="http://schemas.openxmlformats.org/drawingml/2006/diagram" xmlns:a="http://schemas.openxmlformats.org/drawingml/2006/main" uniqueId="urn:microsoft.com/office/officeart/2005/8/colors/accent1_2">
   <dgm:title val=""/>
   <dgm:desc val=""/>
@@ -4396,6 +5149,411 @@
   <dgm:extLst>
     <a:ext uri="http://schemas.microsoft.com/office/drawing/2008/diagram">
       <dsp:dataModelExt xmlns:dsp="http://schemas.microsoft.com/office/drawing/2008/diagram" relId="rId7" minVer="http://schemas.openxmlformats.org/drawingml/2006/diagram"/>
+    </a:ext>
+  </dgm:extLst>
+</dgm:dataModel>
+</file>
+
+<file path=ppt/diagrams/data4.xml><?xml version="1.0" encoding="utf-8"?>
+<dgm:dataModel xmlns:dgm="http://schemas.openxmlformats.org/drawingml/2006/diagram" xmlns:a="http://schemas.openxmlformats.org/drawingml/2006/main">
+  <dgm:ptLst>
+    <dgm:pt modelId="{2B47A0F6-2FA9-4E38-92B1-C3E8A98B4554}" type="doc">
+      <dgm:prSet loTypeId="urn:microsoft.com/office/officeart/2008/layout/LinedList" loCatId="list" qsTypeId="urn:microsoft.com/office/officeart/2005/8/quickstyle/simple1" qsCatId="simple" csTypeId="urn:microsoft.com/office/officeart/2005/8/colors/accent1_2" csCatId="accent1" phldr="1"/>
+      <dgm:spPr/>
+      <dgm:t>
+        <a:bodyPr/>
+        <a:lstStyle/>
+        <a:p>
+          <a:endParaRPr lang="pt-BR"/>
+        </a:p>
+      </dgm:t>
+    </dgm:pt>
+    <dgm:pt modelId="{F88669E7-B2DA-43C1-96F7-80C019362A2F}">
+      <dgm:prSet phldrT="[Texto]" phldr="0"/>
+      <dgm:spPr/>
+      <dgm:t>
+        <a:bodyPr/>
+        <a:lstStyle/>
+        <a:p>
+          <a:endParaRPr lang="pt-BR" dirty="0"/>
+        </a:p>
+      </dgm:t>
+    </dgm:pt>
+    <dgm:pt modelId="{A754D644-063D-4236-A725-7A09329FA73A}" type="parTrans" cxnId="{AD3264AD-E826-4C32-96F8-7F5981ABD94D}">
+      <dgm:prSet/>
+      <dgm:spPr/>
+      <dgm:t>
+        <a:bodyPr/>
+        <a:lstStyle/>
+        <a:p>
+          <a:endParaRPr lang="pt-BR"/>
+        </a:p>
+      </dgm:t>
+    </dgm:pt>
+    <dgm:pt modelId="{F9BEED6F-4010-416F-8FA6-7E2449FAE764}" type="sibTrans" cxnId="{AD3264AD-E826-4C32-96F8-7F5981ABD94D}">
+      <dgm:prSet/>
+      <dgm:spPr/>
+      <dgm:t>
+        <a:bodyPr/>
+        <a:lstStyle/>
+        <a:p>
+          <a:endParaRPr lang="pt-BR"/>
+        </a:p>
+      </dgm:t>
+    </dgm:pt>
+    <dgm:pt modelId="{8FD80590-C7F5-4A74-8527-68E46442DBA6}">
+      <dgm:prSet phldrT="[Texto]" phldr="0"/>
+      <dgm:spPr/>
+      <dgm:t>
+        <a:bodyPr/>
+        <a:lstStyle/>
+        <a:p>
+          <a:r>
+            <a:rPr lang="pt-BR" dirty="0"/>
+            <a:t>Balanceamento de Classes (</a:t>
+          </a:r>
+          <a:r>
+            <a:rPr lang="pt-BR" dirty="0" err="1"/>
+            <a:t>Classification</a:t>
+          </a:r>
+          <a:r>
+            <a:rPr lang="pt-BR" dirty="0"/>
+            <a:t>). </a:t>
+          </a:r>
+          <a:r>
+            <a:rPr lang="pt-BR" dirty="0" err="1"/>
+            <a:t>Ex</a:t>
+          </a:r>
+          <a:r>
+            <a:rPr lang="pt-BR" dirty="0"/>
+            <a:t>: </a:t>
+          </a:r>
+          <a:r>
+            <a:rPr lang="pt-BR" b="0" i="0" dirty="0"/>
+            <a:t>SMOTE</a:t>
+          </a:r>
+          <a:endParaRPr lang="pt-BR" dirty="0"/>
+        </a:p>
+      </dgm:t>
+    </dgm:pt>
+    <dgm:pt modelId="{598C9AFE-A681-46D2-B201-ADA7AAA6C7E5}" type="parTrans" cxnId="{FCEEDF47-21EC-4B81-BFAF-BCA7498E9558}">
+      <dgm:prSet/>
+      <dgm:spPr/>
+      <dgm:t>
+        <a:bodyPr/>
+        <a:lstStyle/>
+        <a:p>
+          <a:endParaRPr lang="pt-BR"/>
+        </a:p>
+      </dgm:t>
+    </dgm:pt>
+    <dgm:pt modelId="{E667067B-90E1-436A-A841-F2835B0E74E0}" type="sibTrans" cxnId="{FCEEDF47-21EC-4B81-BFAF-BCA7498E9558}">
+      <dgm:prSet/>
+      <dgm:spPr/>
+      <dgm:t>
+        <a:bodyPr/>
+        <a:lstStyle/>
+        <a:p>
+          <a:endParaRPr lang="pt-BR"/>
+        </a:p>
+      </dgm:t>
+    </dgm:pt>
+    <dgm:pt modelId="{1EA4C1D9-FCE4-495F-B2EF-CDACE3F4BA9B}">
+      <dgm:prSet phldrT="[Texto]" phldr="0"/>
+      <dgm:spPr/>
+      <dgm:t>
+        <a:bodyPr/>
+        <a:lstStyle/>
+        <a:p>
+          <a:r>
+            <a:rPr lang="pt-BR" dirty="0"/>
+            <a:t>Avaliar efeito de maior período da janela das métricas (Features). </a:t>
+          </a:r>
+          <a:r>
+            <a:rPr lang="pt-BR" dirty="0" err="1"/>
+            <a:t>Ex</a:t>
+          </a:r>
+          <a:r>
+            <a:rPr lang="pt-BR" dirty="0"/>
+            <a:t>: </a:t>
+          </a:r>
+          <a:r>
+            <a:rPr lang="pt-BR" b="0" i="0" dirty="0"/>
+            <a:t>SMOTE</a:t>
+          </a:r>
+          <a:endParaRPr lang="pt-BR" b="0" dirty="0"/>
+        </a:p>
+      </dgm:t>
+    </dgm:pt>
+    <dgm:pt modelId="{39FF6ABC-35B0-49C9-A76C-633D3867EC8A}" type="parTrans" cxnId="{AFAEA735-FC10-4FFD-93C1-2F186FE8E37A}">
+      <dgm:prSet/>
+      <dgm:spPr/>
+      <dgm:t>
+        <a:bodyPr/>
+        <a:lstStyle/>
+        <a:p>
+          <a:endParaRPr lang="pt-BR"/>
+        </a:p>
+      </dgm:t>
+    </dgm:pt>
+    <dgm:pt modelId="{6E491550-9C97-4A4B-8A31-3B95760C8D42}" type="sibTrans" cxnId="{AFAEA735-FC10-4FFD-93C1-2F186FE8E37A}">
+      <dgm:prSet/>
+      <dgm:spPr/>
+      <dgm:t>
+        <a:bodyPr/>
+        <a:lstStyle/>
+        <a:p>
+          <a:endParaRPr lang="pt-BR"/>
+        </a:p>
+      </dgm:t>
+    </dgm:pt>
+    <dgm:pt modelId="{380FA72A-CE5E-4EB9-AB78-3B8058B6E10D}">
+      <dgm:prSet phldrT="[Texto]" phldr="0"/>
+      <dgm:spPr/>
+      <dgm:t>
+        <a:bodyPr/>
+        <a:lstStyle/>
+        <a:p>
+          <a:r>
+            <a:rPr lang="pt-BR"/>
+            <a:t>Utilizar a predição de RUL na Classificação. Ou, usar a predição de Classificação na predição de RUL</a:t>
+          </a:r>
+          <a:endParaRPr lang="pt-BR" dirty="0"/>
+        </a:p>
+      </dgm:t>
+    </dgm:pt>
+    <dgm:pt modelId="{7D87C63D-4781-4451-8E17-A3EB2976DE31}" type="parTrans" cxnId="{43463CF1-E9FC-464B-88D0-3A4D039A4825}">
+      <dgm:prSet/>
+      <dgm:spPr/>
+      <dgm:t>
+        <a:bodyPr/>
+        <a:lstStyle/>
+        <a:p>
+          <a:endParaRPr lang="pt-BR"/>
+        </a:p>
+      </dgm:t>
+    </dgm:pt>
+    <dgm:pt modelId="{394271DA-C6FC-4513-868E-5585A5BAF07D}" type="sibTrans" cxnId="{43463CF1-E9FC-464B-88D0-3A4D039A4825}">
+      <dgm:prSet/>
+      <dgm:spPr/>
+      <dgm:t>
+        <a:bodyPr/>
+        <a:lstStyle/>
+        <a:p>
+          <a:endParaRPr lang="pt-BR"/>
+        </a:p>
+      </dgm:t>
+    </dgm:pt>
+    <dgm:pt modelId="{4FFEFBD0-DA44-4820-BAC3-0FD599CDFD81}">
+      <dgm:prSet phldrT="[Texto]" phldr="0"/>
+      <dgm:spPr/>
+      <dgm:t>
+        <a:bodyPr/>
+        <a:lstStyle/>
+        <a:p>
+          <a:r>
+            <a:rPr lang="pt-BR" b="1" i="0" dirty="0"/>
+            <a:t>SMOTE</a:t>
+          </a:r>
+          <a:endParaRPr lang="pt-BR" dirty="0"/>
+        </a:p>
+        <a:p>
+          <a:r>
+            <a:rPr lang="pt-BR" dirty="0">
+              <a:hlinkClick xmlns:r="http://schemas.openxmlformats.org/officeDocument/2006/relationships" r:id="rId1"/>
+            </a:rPr>
+            <a:t>https://imbalanced-learn.org/stable/references/generated/imblearn.over_sampling.SMOTE.html</a:t>
+          </a:r>
+          <a:endParaRPr lang="pt-BR" dirty="0"/>
+        </a:p>
+      </dgm:t>
+    </dgm:pt>
+    <dgm:pt modelId="{B920231F-0EAF-403E-B46C-56E3AA7565C1}" type="parTrans" cxnId="{6F9589CB-7EB3-4964-8040-2D76F9512A48}">
+      <dgm:prSet/>
+      <dgm:spPr/>
+      <dgm:t>
+        <a:bodyPr/>
+        <a:lstStyle/>
+        <a:p>
+          <a:endParaRPr lang="pt-BR"/>
+        </a:p>
+      </dgm:t>
+    </dgm:pt>
+    <dgm:pt modelId="{E45A2274-F101-424E-B38C-3968A8A2B4CD}" type="sibTrans" cxnId="{6F9589CB-7EB3-4964-8040-2D76F9512A48}">
+      <dgm:prSet/>
+      <dgm:spPr/>
+      <dgm:t>
+        <a:bodyPr/>
+        <a:lstStyle/>
+        <a:p>
+          <a:endParaRPr lang="pt-BR"/>
+        </a:p>
+      </dgm:t>
+    </dgm:pt>
+    <dgm:pt modelId="{79C58CD1-7250-4B23-84BE-58728D5DCBA7}" type="pres">
+      <dgm:prSet presAssocID="{2B47A0F6-2FA9-4E38-92B1-C3E8A98B4554}" presName="vert0" presStyleCnt="0">
+        <dgm:presLayoutVars>
+          <dgm:dir/>
+          <dgm:animOne val="branch"/>
+          <dgm:animLvl val="lvl"/>
+        </dgm:presLayoutVars>
+      </dgm:prSet>
+      <dgm:spPr/>
+    </dgm:pt>
+    <dgm:pt modelId="{3F3DB835-D83C-46F0-A0FE-8678B5162E69}" type="pres">
+      <dgm:prSet presAssocID="{F88669E7-B2DA-43C1-96F7-80C019362A2F}" presName="thickLine" presStyleLbl="alignNode1" presStyleIdx="0" presStyleCnt="1"/>
+      <dgm:spPr/>
+    </dgm:pt>
+    <dgm:pt modelId="{03E717AE-6428-475A-BD44-13336F0EB902}" type="pres">
+      <dgm:prSet presAssocID="{F88669E7-B2DA-43C1-96F7-80C019362A2F}" presName="horz1" presStyleCnt="0"/>
+      <dgm:spPr/>
+    </dgm:pt>
+    <dgm:pt modelId="{BF2EAB99-B567-4A28-99AC-3C590E2D1025}" type="pres">
+      <dgm:prSet presAssocID="{F88669E7-B2DA-43C1-96F7-80C019362A2F}" presName="tx1" presStyleLbl="revTx" presStyleIdx="0" presStyleCnt="5"/>
+      <dgm:spPr/>
+    </dgm:pt>
+    <dgm:pt modelId="{9F8BF901-1E74-425C-9566-0E97F4ED3F55}" type="pres">
+      <dgm:prSet presAssocID="{F88669E7-B2DA-43C1-96F7-80C019362A2F}" presName="vert1" presStyleCnt="0"/>
+      <dgm:spPr/>
+    </dgm:pt>
+    <dgm:pt modelId="{F11056D6-1173-4F12-BD37-CBF09C4B205F}" type="pres">
+      <dgm:prSet presAssocID="{8FD80590-C7F5-4A74-8527-68E46442DBA6}" presName="vertSpace2a" presStyleCnt="0"/>
+      <dgm:spPr/>
+    </dgm:pt>
+    <dgm:pt modelId="{59B6652F-3A4D-44C7-ACDB-1CC30D1ACC6F}" type="pres">
+      <dgm:prSet presAssocID="{8FD80590-C7F5-4A74-8527-68E46442DBA6}" presName="horz2" presStyleCnt="0"/>
+      <dgm:spPr/>
+    </dgm:pt>
+    <dgm:pt modelId="{3967E957-30E0-46FF-A80A-9B575F7D71BA}" type="pres">
+      <dgm:prSet presAssocID="{8FD80590-C7F5-4A74-8527-68E46442DBA6}" presName="horzSpace2" presStyleCnt="0"/>
+      <dgm:spPr/>
+    </dgm:pt>
+    <dgm:pt modelId="{369B4105-D366-4D35-9F94-ACC9A0DFC354}" type="pres">
+      <dgm:prSet presAssocID="{8FD80590-C7F5-4A74-8527-68E46442DBA6}" presName="tx2" presStyleLbl="revTx" presStyleIdx="1" presStyleCnt="5"/>
+      <dgm:spPr/>
+    </dgm:pt>
+    <dgm:pt modelId="{FF92AC22-93CF-4574-92E4-095C0763385A}" type="pres">
+      <dgm:prSet presAssocID="{8FD80590-C7F5-4A74-8527-68E46442DBA6}" presName="vert2" presStyleCnt="0"/>
+      <dgm:spPr/>
+    </dgm:pt>
+    <dgm:pt modelId="{EBFB311D-2956-4543-B497-07A19D20933B}" type="pres">
+      <dgm:prSet presAssocID="{4FFEFBD0-DA44-4820-BAC3-0FD599CDFD81}" presName="horz3" presStyleCnt="0"/>
+      <dgm:spPr/>
+    </dgm:pt>
+    <dgm:pt modelId="{F48553B4-FCC6-4DEA-A730-8AFEB7FAB3A0}" type="pres">
+      <dgm:prSet presAssocID="{4FFEFBD0-DA44-4820-BAC3-0FD599CDFD81}" presName="horzSpace3" presStyleCnt="0"/>
+      <dgm:spPr/>
+    </dgm:pt>
+    <dgm:pt modelId="{CB83673F-1DFB-48D7-81B4-3DB80EC4AD16}" type="pres">
+      <dgm:prSet presAssocID="{4FFEFBD0-DA44-4820-BAC3-0FD599CDFD81}" presName="tx3" presStyleLbl="revTx" presStyleIdx="2" presStyleCnt="5"/>
+      <dgm:spPr/>
+    </dgm:pt>
+    <dgm:pt modelId="{78414064-C041-426F-8FC9-8BDD671A5A3D}" type="pres">
+      <dgm:prSet presAssocID="{4FFEFBD0-DA44-4820-BAC3-0FD599CDFD81}" presName="vert3" presStyleCnt="0"/>
+      <dgm:spPr/>
+    </dgm:pt>
+    <dgm:pt modelId="{427DBE3D-EC07-487F-BEA1-08E593943B3B}" type="pres">
+      <dgm:prSet presAssocID="{8FD80590-C7F5-4A74-8527-68E46442DBA6}" presName="thinLine2b" presStyleLbl="callout" presStyleIdx="0" presStyleCnt="3"/>
+      <dgm:spPr/>
+    </dgm:pt>
+    <dgm:pt modelId="{7756514A-571B-40E8-9BE3-25A7DB17B776}" type="pres">
+      <dgm:prSet presAssocID="{8FD80590-C7F5-4A74-8527-68E46442DBA6}" presName="vertSpace2b" presStyleCnt="0"/>
+      <dgm:spPr/>
+    </dgm:pt>
+    <dgm:pt modelId="{53E12393-2BA7-4127-AB4B-1FB1ECC2F21E}" type="pres">
+      <dgm:prSet presAssocID="{1EA4C1D9-FCE4-495F-B2EF-CDACE3F4BA9B}" presName="horz2" presStyleCnt="0"/>
+      <dgm:spPr/>
+    </dgm:pt>
+    <dgm:pt modelId="{757A12FA-6D70-4B51-9648-5330D258CB2D}" type="pres">
+      <dgm:prSet presAssocID="{1EA4C1D9-FCE4-495F-B2EF-CDACE3F4BA9B}" presName="horzSpace2" presStyleCnt="0"/>
+      <dgm:spPr/>
+    </dgm:pt>
+    <dgm:pt modelId="{A5F3EBC6-324B-4A26-A5E2-3F33A6F46762}" type="pres">
+      <dgm:prSet presAssocID="{1EA4C1D9-FCE4-495F-B2EF-CDACE3F4BA9B}" presName="tx2" presStyleLbl="revTx" presStyleIdx="3" presStyleCnt="5"/>
+      <dgm:spPr/>
+    </dgm:pt>
+    <dgm:pt modelId="{0694889A-5E47-44DA-B3EE-F88293584B65}" type="pres">
+      <dgm:prSet presAssocID="{1EA4C1D9-FCE4-495F-B2EF-CDACE3F4BA9B}" presName="vert2" presStyleCnt="0"/>
+      <dgm:spPr/>
+    </dgm:pt>
+    <dgm:pt modelId="{CA427285-019A-471E-B1B3-723ECBF1E5B0}" type="pres">
+      <dgm:prSet presAssocID="{1EA4C1D9-FCE4-495F-B2EF-CDACE3F4BA9B}" presName="thinLine2b" presStyleLbl="callout" presStyleIdx="1" presStyleCnt="3"/>
+      <dgm:spPr/>
+    </dgm:pt>
+    <dgm:pt modelId="{147F88FE-2133-459A-8A75-F7367F1AADAC}" type="pres">
+      <dgm:prSet presAssocID="{1EA4C1D9-FCE4-495F-B2EF-CDACE3F4BA9B}" presName="vertSpace2b" presStyleCnt="0"/>
+      <dgm:spPr/>
+    </dgm:pt>
+    <dgm:pt modelId="{0EF4E7CC-9102-484E-924E-06ECE1CDA8F7}" type="pres">
+      <dgm:prSet presAssocID="{380FA72A-CE5E-4EB9-AB78-3B8058B6E10D}" presName="horz2" presStyleCnt="0"/>
+      <dgm:spPr/>
+    </dgm:pt>
+    <dgm:pt modelId="{CF0E0724-B2B6-4B4D-97FE-339C7B622870}" type="pres">
+      <dgm:prSet presAssocID="{380FA72A-CE5E-4EB9-AB78-3B8058B6E10D}" presName="horzSpace2" presStyleCnt="0"/>
+      <dgm:spPr/>
+    </dgm:pt>
+    <dgm:pt modelId="{AA1BFEBE-EE3F-4BB6-897F-6CE57540A494}" type="pres">
+      <dgm:prSet presAssocID="{380FA72A-CE5E-4EB9-AB78-3B8058B6E10D}" presName="tx2" presStyleLbl="revTx" presStyleIdx="4" presStyleCnt="5"/>
+      <dgm:spPr/>
+    </dgm:pt>
+    <dgm:pt modelId="{B11AF4AC-9203-43AF-BD9F-6548B6344B16}" type="pres">
+      <dgm:prSet presAssocID="{380FA72A-CE5E-4EB9-AB78-3B8058B6E10D}" presName="vert2" presStyleCnt="0"/>
+      <dgm:spPr/>
+    </dgm:pt>
+    <dgm:pt modelId="{523F9227-928A-4DDF-B36A-C1C5755590BD}" type="pres">
+      <dgm:prSet presAssocID="{380FA72A-CE5E-4EB9-AB78-3B8058B6E10D}" presName="thinLine2b" presStyleLbl="callout" presStyleIdx="2" presStyleCnt="3"/>
+      <dgm:spPr/>
+    </dgm:pt>
+    <dgm:pt modelId="{44AE5FAF-3182-40F3-AD3F-F21A6E8E94E4}" type="pres">
+      <dgm:prSet presAssocID="{380FA72A-CE5E-4EB9-AB78-3B8058B6E10D}" presName="vertSpace2b" presStyleCnt="0"/>
+      <dgm:spPr/>
+    </dgm:pt>
+  </dgm:ptLst>
+  <dgm:cxnLst>
+    <dgm:cxn modelId="{AFAEA735-FC10-4FFD-93C1-2F186FE8E37A}" srcId="{F88669E7-B2DA-43C1-96F7-80C019362A2F}" destId="{1EA4C1D9-FCE4-495F-B2EF-CDACE3F4BA9B}" srcOrd="1" destOrd="0" parTransId="{39FF6ABC-35B0-49C9-A76C-633D3867EC8A}" sibTransId="{6E491550-9C97-4A4B-8A31-3B95760C8D42}"/>
+    <dgm:cxn modelId="{7EA64B65-CBD3-4B2B-ADFD-2E323B0819D1}" type="presOf" srcId="{F88669E7-B2DA-43C1-96F7-80C019362A2F}" destId="{BF2EAB99-B567-4A28-99AC-3C590E2D1025}" srcOrd="0" destOrd="0" presId="urn:microsoft.com/office/officeart/2008/layout/LinedList"/>
+    <dgm:cxn modelId="{FCEEDF47-21EC-4B81-BFAF-BCA7498E9558}" srcId="{F88669E7-B2DA-43C1-96F7-80C019362A2F}" destId="{8FD80590-C7F5-4A74-8527-68E46442DBA6}" srcOrd="0" destOrd="0" parTransId="{598C9AFE-A681-46D2-B201-ADA7AAA6C7E5}" sibTransId="{E667067B-90E1-436A-A841-F2835B0E74E0}"/>
+    <dgm:cxn modelId="{3246C157-DC37-4227-A3D1-F1F1FD512867}" type="presOf" srcId="{380FA72A-CE5E-4EB9-AB78-3B8058B6E10D}" destId="{AA1BFEBE-EE3F-4BB6-897F-6CE57540A494}" srcOrd="0" destOrd="0" presId="urn:microsoft.com/office/officeart/2008/layout/LinedList"/>
+    <dgm:cxn modelId="{023FE48A-AFCA-40E8-929E-F1276C8EBEE5}" type="presOf" srcId="{4FFEFBD0-DA44-4820-BAC3-0FD599CDFD81}" destId="{CB83673F-1DFB-48D7-81B4-3DB80EC4AD16}" srcOrd="0" destOrd="0" presId="urn:microsoft.com/office/officeart/2008/layout/LinedList"/>
+    <dgm:cxn modelId="{AD3264AD-E826-4C32-96F8-7F5981ABD94D}" srcId="{2B47A0F6-2FA9-4E38-92B1-C3E8A98B4554}" destId="{F88669E7-B2DA-43C1-96F7-80C019362A2F}" srcOrd="0" destOrd="0" parTransId="{A754D644-063D-4236-A725-7A09329FA73A}" sibTransId="{F9BEED6F-4010-416F-8FA6-7E2449FAE764}"/>
+    <dgm:cxn modelId="{CFFAA3B9-4608-4073-9172-2EBBE74F6D48}" type="presOf" srcId="{1EA4C1D9-FCE4-495F-B2EF-CDACE3F4BA9B}" destId="{A5F3EBC6-324B-4A26-A5E2-3F33A6F46762}" srcOrd="0" destOrd="0" presId="urn:microsoft.com/office/officeart/2008/layout/LinedList"/>
+    <dgm:cxn modelId="{650EB4C5-6872-49CF-9AC6-B0F7E6C51A8C}" type="presOf" srcId="{8FD80590-C7F5-4A74-8527-68E46442DBA6}" destId="{369B4105-D366-4D35-9F94-ACC9A0DFC354}" srcOrd="0" destOrd="0" presId="urn:microsoft.com/office/officeart/2008/layout/LinedList"/>
+    <dgm:cxn modelId="{6F9589CB-7EB3-4964-8040-2D76F9512A48}" srcId="{8FD80590-C7F5-4A74-8527-68E46442DBA6}" destId="{4FFEFBD0-DA44-4820-BAC3-0FD599CDFD81}" srcOrd="0" destOrd="0" parTransId="{B920231F-0EAF-403E-B46C-56E3AA7565C1}" sibTransId="{E45A2274-F101-424E-B38C-3968A8A2B4CD}"/>
+    <dgm:cxn modelId="{43463CF1-E9FC-464B-88D0-3A4D039A4825}" srcId="{F88669E7-B2DA-43C1-96F7-80C019362A2F}" destId="{380FA72A-CE5E-4EB9-AB78-3B8058B6E10D}" srcOrd="2" destOrd="0" parTransId="{7D87C63D-4781-4451-8E17-A3EB2976DE31}" sibTransId="{394271DA-C6FC-4513-868E-5585A5BAF07D}"/>
+    <dgm:cxn modelId="{CF8CB0F3-8981-410A-A2DF-23D6C5012303}" type="presOf" srcId="{2B47A0F6-2FA9-4E38-92B1-C3E8A98B4554}" destId="{79C58CD1-7250-4B23-84BE-58728D5DCBA7}" srcOrd="0" destOrd="0" presId="urn:microsoft.com/office/officeart/2008/layout/LinedList"/>
+    <dgm:cxn modelId="{17BEA444-5F5B-4ABF-860F-3A91A57FDB1D}" type="presParOf" srcId="{79C58CD1-7250-4B23-84BE-58728D5DCBA7}" destId="{3F3DB835-D83C-46F0-A0FE-8678B5162E69}" srcOrd="0" destOrd="0" presId="urn:microsoft.com/office/officeart/2008/layout/LinedList"/>
+    <dgm:cxn modelId="{6A9BFD74-A47B-48C6-8F7E-6A48CB0B1295}" type="presParOf" srcId="{79C58CD1-7250-4B23-84BE-58728D5DCBA7}" destId="{03E717AE-6428-475A-BD44-13336F0EB902}" srcOrd="1" destOrd="0" presId="urn:microsoft.com/office/officeart/2008/layout/LinedList"/>
+    <dgm:cxn modelId="{B06D78A1-99DA-4791-AABB-3ECA43BCC7EB}" type="presParOf" srcId="{03E717AE-6428-475A-BD44-13336F0EB902}" destId="{BF2EAB99-B567-4A28-99AC-3C590E2D1025}" srcOrd="0" destOrd="0" presId="urn:microsoft.com/office/officeart/2008/layout/LinedList"/>
+    <dgm:cxn modelId="{44F34163-2655-4423-A96D-33D81D03A989}" type="presParOf" srcId="{03E717AE-6428-475A-BD44-13336F0EB902}" destId="{9F8BF901-1E74-425C-9566-0E97F4ED3F55}" srcOrd="1" destOrd="0" presId="urn:microsoft.com/office/officeart/2008/layout/LinedList"/>
+    <dgm:cxn modelId="{E08F6A7A-9CA1-4A11-AF99-187C8B9F1ABF}" type="presParOf" srcId="{9F8BF901-1E74-425C-9566-0E97F4ED3F55}" destId="{F11056D6-1173-4F12-BD37-CBF09C4B205F}" srcOrd="0" destOrd="0" presId="urn:microsoft.com/office/officeart/2008/layout/LinedList"/>
+    <dgm:cxn modelId="{52B47E8C-481D-427E-B367-9B6081C9E06C}" type="presParOf" srcId="{9F8BF901-1E74-425C-9566-0E97F4ED3F55}" destId="{59B6652F-3A4D-44C7-ACDB-1CC30D1ACC6F}" srcOrd="1" destOrd="0" presId="urn:microsoft.com/office/officeart/2008/layout/LinedList"/>
+    <dgm:cxn modelId="{44FF4827-B999-49C7-A519-F7AA496B9C2F}" type="presParOf" srcId="{59B6652F-3A4D-44C7-ACDB-1CC30D1ACC6F}" destId="{3967E957-30E0-46FF-A80A-9B575F7D71BA}" srcOrd="0" destOrd="0" presId="urn:microsoft.com/office/officeart/2008/layout/LinedList"/>
+    <dgm:cxn modelId="{46A27020-BFF5-4472-B56C-6F4E93A518FA}" type="presParOf" srcId="{59B6652F-3A4D-44C7-ACDB-1CC30D1ACC6F}" destId="{369B4105-D366-4D35-9F94-ACC9A0DFC354}" srcOrd="1" destOrd="0" presId="urn:microsoft.com/office/officeart/2008/layout/LinedList"/>
+    <dgm:cxn modelId="{2C445C9A-0615-4BE4-A774-A288847CC4FA}" type="presParOf" srcId="{59B6652F-3A4D-44C7-ACDB-1CC30D1ACC6F}" destId="{FF92AC22-93CF-4574-92E4-095C0763385A}" srcOrd="2" destOrd="0" presId="urn:microsoft.com/office/officeart/2008/layout/LinedList"/>
+    <dgm:cxn modelId="{BA65F73C-062F-4D1E-9318-C98EA44090AC}" type="presParOf" srcId="{FF92AC22-93CF-4574-92E4-095C0763385A}" destId="{EBFB311D-2956-4543-B497-07A19D20933B}" srcOrd="0" destOrd="0" presId="urn:microsoft.com/office/officeart/2008/layout/LinedList"/>
+    <dgm:cxn modelId="{7DED017F-EDFE-4767-A494-6AE2F323D6EC}" type="presParOf" srcId="{EBFB311D-2956-4543-B497-07A19D20933B}" destId="{F48553B4-FCC6-4DEA-A730-8AFEB7FAB3A0}" srcOrd="0" destOrd="0" presId="urn:microsoft.com/office/officeart/2008/layout/LinedList"/>
+    <dgm:cxn modelId="{DCBDBF58-CE37-49FE-9341-A3A33B644E3E}" type="presParOf" srcId="{EBFB311D-2956-4543-B497-07A19D20933B}" destId="{CB83673F-1DFB-48D7-81B4-3DB80EC4AD16}" srcOrd="1" destOrd="0" presId="urn:microsoft.com/office/officeart/2008/layout/LinedList"/>
+    <dgm:cxn modelId="{18F1E8B7-06E0-4ACC-B38A-AE7C0C24B170}" type="presParOf" srcId="{EBFB311D-2956-4543-B497-07A19D20933B}" destId="{78414064-C041-426F-8FC9-8BDD671A5A3D}" srcOrd="2" destOrd="0" presId="urn:microsoft.com/office/officeart/2008/layout/LinedList"/>
+    <dgm:cxn modelId="{B30C12EB-F922-4BDC-A993-2B1C96A1D852}" type="presParOf" srcId="{9F8BF901-1E74-425C-9566-0E97F4ED3F55}" destId="{427DBE3D-EC07-487F-BEA1-08E593943B3B}" srcOrd="2" destOrd="0" presId="urn:microsoft.com/office/officeart/2008/layout/LinedList"/>
+    <dgm:cxn modelId="{585A3131-0C2B-4517-8B9B-61BB730082B3}" type="presParOf" srcId="{9F8BF901-1E74-425C-9566-0E97F4ED3F55}" destId="{7756514A-571B-40E8-9BE3-25A7DB17B776}" srcOrd="3" destOrd="0" presId="urn:microsoft.com/office/officeart/2008/layout/LinedList"/>
+    <dgm:cxn modelId="{A17DAB44-144A-4E05-974F-5A9337D4388B}" type="presParOf" srcId="{9F8BF901-1E74-425C-9566-0E97F4ED3F55}" destId="{53E12393-2BA7-4127-AB4B-1FB1ECC2F21E}" srcOrd="4" destOrd="0" presId="urn:microsoft.com/office/officeart/2008/layout/LinedList"/>
+    <dgm:cxn modelId="{37D270D9-9ED8-4093-9EC4-3421FEEC8BA2}" type="presParOf" srcId="{53E12393-2BA7-4127-AB4B-1FB1ECC2F21E}" destId="{757A12FA-6D70-4B51-9648-5330D258CB2D}" srcOrd="0" destOrd="0" presId="urn:microsoft.com/office/officeart/2008/layout/LinedList"/>
+    <dgm:cxn modelId="{9846D5B1-B4B8-428F-8ADE-66723FD1A212}" type="presParOf" srcId="{53E12393-2BA7-4127-AB4B-1FB1ECC2F21E}" destId="{A5F3EBC6-324B-4A26-A5E2-3F33A6F46762}" srcOrd="1" destOrd="0" presId="urn:microsoft.com/office/officeart/2008/layout/LinedList"/>
+    <dgm:cxn modelId="{58646523-F8F4-4777-81F7-0EDA1EB935D3}" type="presParOf" srcId="{53E12393-2BA7-4127-AB4B-1FB1ECC2F21E}" destId="{0694889A-5E47-44DA-B3EE-F88293584B65}" srcOrd="2" destOrd="0" presId="urn:microsoft.com/office/officeart/2008/layout/LinedList"/>
+    <dgm:cxn modelId="{649D28AD-234C-48D5-BFF0-B94F4330C668}" type="presParOf" srcId="{9F8BF901-1E74-425C-9566-0E97F4ED3F55}" destId="{CA427285-019A-471E-B1B3-723ECBF1E5B0}" srcOrd="5" destOrd="0" presId="urn:microsoft.com/office/officeart/2008/layout/LinedList"/>
+    <dgm:cxn modelId="{268BA2BC-243E-4A9C-857E-B2D3CDB2ED40}" type="presParOf" srcId="{9F8BF901-1E74-425C-9566-0E97F4ED3F55}" destId="{147F88FE-2133-459A-8A75-F7367F1AADAC}" srcOrd="6" destOrd="0" presId="urn:microsoft.com/office/officeart/2008/layout/LinedList"/>
+    <dgm:cxn modelId="{2775AFB8-A1F5-426F-B307-F85EA9C6AE1B}" type="presParOf" srcId="{9F8BF901-1E74-425C-9566-0E97F4ED3F55}" destId="{0EF4E7CC-9102-484E-924E-06ECE1CDA8F7}" srcOrd="7" destOrd="0" presId="urn:microsoft.com/office/officeart/2008/layout/LinedList"/>
+    <dgm:cxn modelId="{20FAC44F-6417-4E15-B5F0-571B5D48239C}" type="presParOf" srcId="{0EF4E7CC-9102-484E-924E-06ECE1CDA8F7}" destId="{CF0E0724-B2B6-4B4D-97FE-339C7B622870}" srcOrd="0" destOrd="0" presId="urn:microsoft.com/office/officeart/2008/layout/LinedList"/>
+    <dgm:cxn modelId="{7879EEEF-C0EB-484C-A182-A245F5705160}" type="presParOf" srcId="{0EF4E7CC-9102-484E-924E-06ECE1CDA8F7}" destId="{AA1BFEBE-EE3F-4BB6-897F-6CE57540A494}" srcOrd="1" destOrd="0" presId="urn:microsoft.com/office/officeart/2008/layout/LinedList"/>
+    <dgm:cxn modelId="{FEE25334-E0B9-40C3-9C94-A5209506D2B3}" type="presParOf" srcId="{0EF4E7CC-9102-484E-924E-06ECE1CDA8F7}" destId="{B11AF4AC-9203-43AF-BD9F-6548B6344B16}" srcOrd="2" destOrd="0" presId="urn:microsoft.com/office/officeart/2008/layout/LinedList"/>
+    <dgm:cxn modelId="{B7639EA4-BEE8-45C4-93C9-BB07E797C6BC}" type="presParOf" srcId="{9F8BF901-1E74-425C-9566-0E97F4ED3F55}" destId="{523F9227-928A-4DDF-B36A-C1C5755590BD}" srcOrd="8" destOrd="0" presId="urn:microsoft.com/office/officeart/2008/layout/LinedList"/>
+    <dgm:cxn modelId="{4608EFA0-BF6F-46D5-A682-EEE7EE77D287}" type="presParOf" srcId="{9F8BF901-1E74-425C-9566-0E97F4ED3F55}" destId="{44AE5FAF-3182-40F3-AD3F-F21A6E8E94E4}" srcOrd="9" destOrd="0" presId="urn:microsoft.com/office/officeart/2008/layout/LinedList"/>
+  </dgm:cxnLst>
+  <dgm:bg/>
+  <dgm:whole/>
+  <dgm:extLst>
+    <a:ext uri="http://schemas.microsoft.com/office/drawing/2008/diagram">
+      <dsp:dataModelExt xmlns:dsp="http://schemas.microsoft.com/office/drawing/2008/diagram" relId="rId6" minVer="http://schemas.openxmlformats.org/drawingml/2006/diagram"/>
     </a:ext>
   </dgm:extLst>
 </dgm:dataModel>
@@ -6715,6 +7873,565 @@
 </dsp:drawing>
 </file>
 
+<file path=ppt/diagrams/drawing4.xml><?xml version="1.0" encoding="utf-8"?>
+<dsp:drawing xmlns:dgm="http://schemas.openxmlformats.org/drawingml/2006/diagram" xmlns:dsp="http://schemas.microsoft.com/office/drawing/2008/diagram" xmlns:a="http://schemas.openxmlformats.org/drawingml/2006/main">
+  <dsp:spTree>
+    <dsp:nvGrpSpPr>
+      <dsp:cNvPr id="0" name=""/>
+      <dsp:cNvGrpSpPr/>
+    </dsp:nvGrpSpPr>
+    <dsp:grpSpPr/>
+    <dsp:sp modelId="{3F3DB835-D83C-46F0-A0FE-8678B5162E69}">
+      <dsp:nvSpPr>
+        <dsp:cNvPr id="0" name=""/>
+        <dsp:cNvSpPr/>
+      </dsp:nvSpPr>
+      <dsp:spPr>
+        <a:xfrm>
+          <a:off x="0" y="0"/>
+          <a:ext cx="10614211" cy="0"/>
+        </a:xfrm>
+        <a:prstGeom prst="line">
+          <a:avLst/>
+        </a:prstGeom>
+        <a:solidFill>
+          <a:schemeClr val="accent1">
+            <a:hueOff val="0"/>
+            <a:satOff val="0"/>
+            <a:lumOff val="0"/>
+            <a:alphaOff val="0"/>
+          </a:schemeClr>
+        </a:solidFill>
+        <a:ln w="12700" cap="flat" cmpd="sng" algn="ctr">
+          <a:solidFill>
+            <a:schemeClr val="accent1">
+              <a:hueOff val="0"/>
+              <a:satOff val="0"/>
+              <a:lumOff val="0"/>
+              <a:alphaOff val="0"/>
+            </a:schemeClr>
+          </a:solidFill>
+          <a:prstDash val="solid"/>
+        </a:ln>
+        <a:effectLst/>
+      </dsp:spPr>
+      <dsp:style>
+        <a:lnRef idx="2">
+          <a:scrgbClr r="0" g="0" b="0"/>
+        </a:lnRef>
+        <a:fillRef idx="1">
+          <a:scrgbClr r="0" g="0" b="0"/>
+        </a:fillRef>
+        <a:effectRef idx="0">
+          <a:scrgbClr r="0" g="0" b="0"/>
+        </a:effectRef>
+        <a:fontRef idx="minor">
+          <a:schemeClr val="lt1"/>
+        </a:fontRef>
+      </dsp:style>
+    </dsp:sp>
+    <dsp:sp modelId="{BF2EAB99-B567-4A28-99AC-3C590E2D1025}">
+      <dsp:nvSpPr>
+        <dsp:cNvPr id="0" name=""/>
+        <dsp:cNvSpPr/>
+      </dsp:nvSpPr>
+      <dsp:spPr>
+        <a:xfrm>
+          <a:off x="0" y="0"/>
+          <a:ext cx="2122842" cy="4948518"/>
+        </a:xfrm>
+        <a:prstGeom prst="rect">
+          <a:avLst/>
+        </a:prstGeom>
+        <a:noFill/>
+        <a:ln>
+          <a:noFill/>
+        </a:ln>
+        <a:effectLst/>
+      </dsp:spPr>
+      <dsp:style>
+        <a:lnRef idx="0">
+          <a:scrgbClr r="0" g="0" b="0"/>
+        </a:lnRef>
+        <a:fillRef idx="0">
+          <a:scrgbClr r="0" g="0" b="0"/>
+        </a:fillRef>
+        <a:effectRef idx="0">
+          <a:scrgbClr r="0" g="0" b="0"/>
+        </a:effectRef>
+        <a:fontRef idx="minor"/>
+      </dsp:style>
+      <dsp:txBody>
+        <a:bodyPr spcFirstLastPara="0" vert="horz" wrap="square" lIns="247650" tIns="247650" rIns="247650" bIns="247650" numCol="1" spcCol="1270" anchor="t" anchorCtr="0">
+          <a:noAutofit/>
+        </a:bodyPr>
+        <a:lstStyle/>
+        <a:p>
+          <a:pPr marL="0" lvl="0" indent="0" algn="l" defTabSz="2889250">
+            <a:lnSpc>
+              <a:spcPct val="90000"/>
+            </a:lnSpc>
+            <a:spcBef>
+              <a:spcPct val="0"/>
+            </a:spcBef>
+            <a:spcAft>
+              <a:spcPct val="35000"/>
+            </a:spcAft>
+            <a:buNone/>
+          </a:pPr>
+          <a:endParaRPr lang="pt-BR" sz="6500" kern="1200" dirty="0"/>
+        </a:p>
+      </dsp:txBody>
+      <dsp:txXfrm>
+        <a:off x="0" y="0"/>
+        <a:ext cx="2122842" cy="4948518"/>
+      </dsp:txXfrm>
+    </dsp:sp>
+    <dsp:sp modelId="{369B4105-D366-4D35-9F94-ACC9A0DFC354}">
+      <dsp:nvSpPr>
+        <dsp:cNvPr id="0" name=""/>
+        <dsp:cNvSpPr/>
+      </dsp:nvSpPr>
+      <dsp:spPr>
+        <a:xfrm>
+          <a:off x="2282055" y="77320"/>
+          <a:ext cx="4086471" cy="1546411"/>
+        </a:xfrm>
+        <a:prstGeom prst="rect">
+          <a:avLst/>
+        </a:prstGeom>
+        <a:noFill/>
+        <a:ln>
+          <a:noFill/>
+        </a:ln>
+        <a:effectLst/>
+      </dsp:spPr>
+      <dsp:style>
+        <a:lnRef idx="0">
+          <a:scrgbClr r="0" g="0" b="0"/>
+        </a:lnRef>
+        <a:fillRef idx="0">
+          <a:scrgbClr r="0" g="0" b="0"/>
+        </a:fillRef>
+        <a:effectRef idx="0">
+          <a:scrgbClr r="0" g="0" b="0"/>
+        </a:effectRef>
+        <a:fontRef idx="minor"/>
+      </dsp:style>
+      <dsp:txBody>
+        <a:bodyPr spcFirstLastPara="0" vert="horz" wrap="square" lIns="91440" tIns="91440" rIns="91440" bIns="91440" numCol="1" spcCol="1270" anchor="t" anchorCtr="0">
+          <a:noAutofit/>
+        </a:bodyPr>
+        <a:lstStyle/>
+        <a:p>
+          <a:pPr marL="0" lvl="0" indent="0" algn="l" defTabSz="1066800">
+            <a:lnSpc>
+              <a:spcPct val="90000"/>
+            </a:lnSpc>
+            <a:spcBef>
+              <a:spcPct val="0"/>
+            </a:spcBef>
+            <a:spcAft>
+              <a:spcPct val="35000"/>
+            </a:spcAft>
+            <a:buNone/>
+          </a:pPr>
+          <a:r>
+            <a:rPr lang="pt-BR" sz="2400" kern="1200" dirty="0"/>
+            <a:t>Balanceamento de Classes (</a:t>
+          </a:r>
+          <a:r>
+            <a:rPr lang="pt-BR" sz="2400" kern="1200" dirty="0" err="1"/>
+            <a:t>Classification</a:t>
+          </a:r>
+          <a:r>
+            <a:rPr lang="pt-BR" sz="2400" kern="1200" dirty="0"/>
+            <a:t>). </a:t>
+          </a:r>
+          <a:r>
+            <a:rPr lang="pt-BR" sz="2400" kern="1200" dirty="0" err="1"/>
+            <a:t>Ex</a:t>
+          </a:r>
+          <a:r>
+            <a:rPr lang="pt-BR" sz="2400" kern="1200" dirty="0"/>
+            <a:t>: </a:t>
+          </a:r>
+          <a:r>
+            <a:rPr lang="pt-BR" sz="2400" b="0" i="0" kern="1200" dirty="0"/>
+            <a:t>SMOTE</a:t>
+          </a:r>
+          <a:endParaRPr lang="pt-BR" sz="2400" kern="1200" dirty="0"/>
+        </a:p>
+      </dsp:txBody>
+      <dsp:txXfrm>
+        <a:off x="2282055" y="77320"/>
+        <a:ext cx="4086471" cy="1546411"/>
+      </dsp:txXfrm>
+    </dsp:sp>
+    <dsp:sp modelId="{CB83673F-1DFB-48D7-81B4-3DB80EC4AD16}">
+      <dsp:nvSpPr>
+        <dsp:cNvPr id="0" name=""/>
+        <dsp:cNvSpPr/>
+      </dsp:nvSpPr>
+      <dsp:spPr>
+        <a:xfrm>
+          <a:off x="6527739" y="77320"/>
+          <a:ext cx="4086471" cy="1546411"/>
+        </a:xfrm>
+        <a:prstGeom prst="rect">
+          <a:avLst/>
+        </a:prstGeom>
+        <a:noFill/>
+        <a:ln>
+          <a:noFill/>
+        </a:ln>
+        <a:effectLst/>
+      </dsp:spPr>
+      <dsp:style>
+        <a:lnRef idx="0">
+          <a:scrgbClr r="0" g="0" b="0"/>
+        </a:lnRef>
+        <a:fillRef idx="0">
+          <a:scrgbClr r="0" g="0" b="0"/>
+        </a:fillRef>
+        <a:effectRef idx="0">
+          <a:scrgbClr r="0" g="0" b="0"/>
+        </a:effectRef>
+        <a:fontRef idx="minor"/>
+      </dsp:style>
+      <dsp:txBody>
+        <a:bodyPr spcFirstLastPara="0" vert="horz" wrap="square" lIns="38100" tIns="38100" rIns="38100" bIns="38100" numCol="1" spcCol="1270" anchor="t" anchorCtr="0">
+          <a:noAutofit/>
+        </a:bodyPr>
+        <a:lstStyle/>
+        <a:p>
+          <a:pPr marL="0" lvl="0" indent="0" algn="l" defTabSz="444500">
+            <a:lnSpc>
+              <a:spcPct val="90000"/>
+            </a:lnSpc>
+            <a:spcBef>
+              <a:spcPct val="0"/>
+            </a:spcBef>
+            <a:spcAft>
+              <a:spcPct val="35000"/>
+            </a:spcAft>
+            <a:buNone/>
+          </a:pPr>
+          <a:r>
+            <a:rPr lang="pt-BR" sz="1000" b="1" i="0" kern="1200" dirty="0"/>
+            <a:t>SMOTE</a:t>
+          </a:r>
+          <a:endParaRPr lang="pt-BR" sz="1000" kern="1200" dirty="0"/>
+        </a:p>
+        <a:p>
+          <a:pPr marL="0" lvl="0" indent="0" algn="l" defTabSz="444500">
+            <a:lnSpc>
+              <a:spcPct val="90000"/>
+            </a:lnSpc>
+            <a:spcBef>
+              <a:spcPct val="0"/>
+            </a:spcBef>
+            <a:spcAft>
+              <a:spcPct val="35000"/>
+            </a:spcAft>
+            <a:buNone/>
+          </a:pPr>
+          <a:r>
+            <a:rPr lang="pt-BR" sz="1000" kern="1200" dirty="0">
+              <a:hlinkClick xmlns:r="http://schemas.openxmlformats.org/officeDocument/2006/relationships" r:id="rId1"/>
+            </a:rPr>
+            <a:t>https://imbalanced-learn.org/stable/references/generated/imblearn.over_sampling.SMOTE.html</a:t>
+          </a:r>
+          <a:endParaRPr lang="pt-BR" sz="1000" kern="1200" dirty="0"/>
+        </a:p>
+      </dsp:txBody>
+      <dsp:txXfrm>
+        <a:off x="6527739" y="77320"/>
+        <a:ext cx="4086471" cy="1546411"/>
+      </dsp:txXfrm>
+    </dsp:sp>
+    <dsp:sp modelId="{427DBE3D-EC07-487F-BEA1-08E593943B3B}">
+      <dsp:nvSpPr>
+        <dsp:cNvPr id="0" name=""/>
+        <dsp:cNvSpPr/>
+      </dsp:nvSpPr>
+      <dsp:spPr>
+        <a:xfrm>
+          <a:off x="2122842" y="1623732"/>
+          <a:ext cx="8491368" cy="0"/>
+        </a:xfrm>
+        <a:prstGeom prst="line">
+          <a:avLst/>
+        </a:prstGeom>
+        <a:solidFill>
+          <a:schemeClr val="accent1">
+            <a:hueOff val="0"/>
+            <a:satOff val="0"/>
+            <a:lumOff val="0"/>
+            <a:alphaOff val="0"/>
+          </a:schemeClr>
+        </a:solidFill>
+        <a:ln w="12700" cap="flat" cmpd="sng" algn="ctr">
+          <a:solidFill>
+            <a:schemeClr val="accent1">
+              <a:tint val="50000"/>
+              <a:hueOff val="0"/>
+              <a:satOff val="0"/>
+              <a:lumOff val="0"/>
+              <a:alphaOff val="0"/>
+            </a:schemeClr>
+          </a:solidFill>
+          <a:prstDash val="solid"/>
+        </a:ln>
+        <a:effectLst/>
+      </dsp:spPr>
+      <dsp:style>
+        <a:lnRef idx="2">
+          <a:scrgbClr r="0" g="0" b="0"/>
+        </a:lnRef>
+        <a:fillRef idx="1">
+          <a:scrgbClr r="0" g="0" b="0"/>
+        </a:fillRef>
+        <a:effectRef idx="0">
+          <a:scrgbClr r="0" g="0" b="0"/>
+        </a:effectRef>
+        <a:fontRef idx="minor"/>
+      </dsp:style>
+    </dsp:sp>
+    <dsp:sp modelId="{A5F3EBC6-324B-4A26-A5E2-3F33A6F46762}">
+      <dsp:nvSpPr>
+        <dsp:cNvPr id="0" name=""/>
+        <dsp:cNvSpPr/>
+      </dsp:nvSpPr>
+      <dsp:spPr>
+        <a:xfrm>
+          <a:off x="2282055" y="1701053"/>
+          <a:ext cx="4086471" cy="1546411"/>
+        </a:xfrm>
+        <a:prstGeom prst="rect">
+          <a:avLst/>
+        </a:prstGeom>
+        <a:noFill/>
+        <a:ln>
+          <a:noFill/>
+        </a:ln>
+        <a:effectLst/>
+      </dsp:spPr>
+      <dsp:style>
+        <a:lnRef idx="0">
+          <a:scrgbClr r="0" g="0" b="0"/>
+        </a:lnRef>
+        <a:fillRef idx="0">
+          <a:scrgbClr r="0" g="0" b="0"/>
+        </a:fillRef>
+        <a:effectRef idx="0">
+          <a:scrgbClr r="0" g="0" b="0"/>
+        </a:effectRef>
+        <a:fontRef idx="minor"/>
+      </dsp:style>
+      <dsp:txBody>
+        <a:bodyPr spcFirstLastPara="0" vert="horz" wrap="square" lIns="91440" tIns="91440" rIns="91440" bIns="91440" numCol="1" spcCol="1270" anchor="t" anchorCtr="0">
+          <a:noAutofit/>
+        </a:bodyPr>
+        <a:lstStyle/>
+        <a:p>
+          <a:pPr marL="0" lvl="0" indent="0" algn="l" defTabSz="1066800">
+            <a:lnSpc>
+              <a:spcPct val="90000"/>
+            </a:lnSpc>
+            <a:spcBef>
+              <a:spcPct val="0"/>
+            </a:spcBef>
+            <a:spcAft>
+              <a:spcPct val="35000"/>
+            </a:spcAft>
+            <a:buNone/>
+          </a:pPr>
+          <a:r>
+            <a:rPr lang="pt-BR" sz="2400" kern="1200" dirty="0"/>
+            <a:t>Avaliar efeito de maior período da janela das métricas (Features). </a:t>
+          </a:r>
+          <a:r>
+            <a:rPr lang="pt-BR" sz="2400" kern="1200" dirty="0" err="1"/>
+            <a:t>Ex</a:t>
+          </a:r>
+          <a:r>
+            <a:rPr lang="pt-BR" sz="2400" kern="1200" dirty="0"/>
+            <a:t>: </a:t>
+          </a:r>
+          <a:r>
+            <a:rPr lang="pt-BR" sz="2400" b="0" i="0" kern="1200" dirty="0"/>
+            <a:t>SMOTE</a:t>
+          </a:r>
+          <a:endParaRPr lang="pt-BR" sz="2400" b="0" kern="1200" dirty="0"/>
+        </a:p>
+      </dsp:txBody>
+      <dsp:txXfrm>
+        <a:off x="2282055" y="1701053"/>
+        <a:ext cx="4086471" cy="1546411"/>
+      </dsp:txXfrm>
+    </dsp:sp>
+    <dsp:sp modelId="{CA427285-019A-471E-B1B3-723ECBF1E5B0}">
+      <dsp:nvSpPr>
+        <dsp:cNvPr id="0" name=""/>
+        <dsp:cNvSpPr/>
+      </dsp:nvSpPr>
+      <dsp:spPr>
+        <a:xfrm>
+          <a:off x="2122842" y="3247464"/>
+          <a:ext cx="8491368" cy="0"/>
+        </a:xfrm>
+        <a:prstGeom prst="line">
+          <a:avLst/>
+        </a:prstGeom>
+        <a:solidFill>
+          <a:schemeClr val="accent1">
+            <a:hueOff val="0"/>
+            <a:satOff val="0"/>
+            <a:lumOff val="0"/>
+            <a:alphaOff val="0"/>
+          </a:schemeClr>
+        </a:solidFill>
+        <a:ln w="12700" cap="flat" cmpd="sng" algn="ctr">
+          <a:solidFill>
+            <a:schemeClr val="accent1">
+              <a:tint val="50000"/>
+              <a:hueOff val="0"/>
+              <a:satOff val="0"/>
+              <a:lumOff val="0"/>
+              <a:alphaOff val="0"/>
+            </a:schemeClr>
+          </a:solidFill>
+          <a:prstDash val="solid"/>
+        </a:ln>
+        <a:effectLst/>
+      </dsp:spPr>
+      <dsp:style>
+        <a:lnRef idx="2">
+          <a:scrgbClr r="0" g="0" b="0"/>
+        </a:lnRef>
+        <a:fillRef idx="1">
+          <a:scrgbClr r="0" g="0" b="0"/>
+        </a:fillRef>
+        <a:effectRef idx="0">
+          <a:scrgbClr r="0" g="0" b="0"/>
+        </a:effectRef>
+        <a:fontRef idx="minor"/>
+      </dsp:style>
+    </dsp:sp>
+    <dsp:sp modelId="{AA1BFEBE-EE3F-4BB6-897F-6CE57540A494}">
+      <dsp:nvSpPr>
+        <dsp:cNvPr id="0" name=""/>
+        <dsp:cNvSpPr/>
+      </dsp:nvSpPr>
+      <dsp:spPr>
+        <a:xfrm>
+          <a:off x="2282055" y="3324785"/>
+          <a:ext cx="4086471" cy="1546411"/>
+        </a:xfrm>
+        <a:prstGeom prst="rect">
+          <a:avLst/>
+        </a:prstGeom>
+        <a:noFill/>
+        <a:ln>
+          <a:noFill/>
+        </a:ln>
+        <a:effectLst/>
+      </dsp:spPr>
+      <dsp:style>
+        <a:lnRef idx="0">
+          <a:scrgbClr r="0" g="0" b="0"/>
+        </a:lnRef>
+        <a:fillRef idx="0">
+          <a:scrgbClr r="0" g="0" b="0"/>
+        </a:fillRef>
+        <a:effectRef idx="0">
+          <a:scrgbClr r="0" g="0" b="0"/>
+        </a:effectRef>
+        <a:fontRef idx="minor"/>
+      </dsp:style>
+      <dsp:txBody>
+        <a:bodyPr spcFirstLastPara="0" vert="horz" wrap="square" lIns="91440" tIns="91440" rIns="91440" bIns="91440" numCol="1" spcCol="1270" anchor="t" anchorCtr="0">
+          <a:noAutofit/>
+        </a:bodyPr>
+        <a:lstStyle/>
+        <a:p>
+          <a:pPr marL="0" lvl="0" indent="0" algn="l" defTabSz="1066800">
+            <a:lnSpc>
+              <a:spcPct val="90000"/>
+            </a:lnSpc>
+            <a:spcBef>
+              <a:spcPct val="0"/>
+            </a:spcBef>
+            <a:spcAft>
+              <a:spcPct val="35000"/>
+            </a:spcAft>
+            <a:buNone/>
+          </a:pPr>
+          <a:r>
+            <a:rPr lang="pt-BR" sz="2400" kern="1200"/>
+            <a:t>Utilizar a predição de RUL na Classificação. Ou, usar a predição de Classificação na predição de RUL</a:t>
+          </a:r>
+          <a:endParaRPr lang="pt-BR" sz="2400" kern="1200" dirty="0"/>
+        </a:p>
+      </dsp:txBody>
+      <dsp:txXfrm>
+        <a:off x="2282055" y="3324785"/>
+        <a:ext cx="4086471" cy="1546411"/>
+      </dsp:txXfrm>
+    </dsp:sp>
+    <dsp:sp modelId="{523F9227-928A-4DDF-B36A-C1C5755590BD}">
+      <dsp:nvSpPr>
+        <dsp:cNvPr id="0" name=""/>
+        <dsp:cNvSpPr/>
+      </dsp:nvSpPr>
+      <dsp:spPr>
+        <a:xfrm>
+          <a:off x="2122842" y="4871197"/>
+          <a:ext cx="8491368" cy="0"/>
+        </a:xfrm>
+        <a:prstGeom prst="line">
+          <a:avLst/>
+        </a:prstGeom>
+        <a:solidFill>
+          <a:schemeClr val="accent1">
+            <a:hueOff val="0"/>
+            <a:satOff val="0"/>
+            <a:lumOff val="0"/>
+            <a:alphaOff val="0"/>
+          </a:schemeClr>
+        </a:solidFill>
+        <a:ln w="12700" cap="flat" cmpd="sng" algn="ctr">
+          <a:solidFill>
+            <a:schemeClr val="accent1">
+              <a:tint val="50000"/>
+              <a:hueOff val="0"/>
+              <a:satOff val="0"/>
+              <a:lumOff val="0"/>
+              <a:alphaOff val="0"/>
+            </a:schemeClr>
+          </a:solidFill>
+          <a:prstDash val="solid"/>
+        </a:ln>
+        <a:effectLst/>
+      </dsp:spPr>
+      <dsp:style>
+        <a:lnRef idx="2">
+          <a:scrgbClr r="0" g="0" b="0"/>
+        </a:lnRef>
+        <a:fillRef idx="1">
+          <a:scrgbClr r="0" g="0" b="0"/>
+        </a:fillRef>
+        <a:effectRef idx="0">
+          <a:scrgbClr r="0" g="0" b="0"/>
+        </a:effectRef>
+        <a:fontRef idx="minor"/>
+      </dsp:style>
+    </dsp:sp>
+  </dsp:spTree>
+</dsp:drawing>
+</file>
+
 <file path=ppt/diagrams/layout1.xml><?xml version="1.0" encoding="utf-8"?>
 <dgm:layoutDef xmlns:dgm="http://schemas.openxmlformats.org/drawingml/2006/diagram" xmlns:a="http://schemas.openxmlformats.org/drawingml/2006/main" uniqueId="urn:microsoft.com/office/officeart/2005/8/layout/default">
   <dgm:title val=""/>
@@ -7310,6 +9027,472 @@
 </dgm:layoutDef>
 </file>
 
+<file path=ppt/diagrams/layout4.xml><?xml version="1.0" encoding="utf-8"?>
+<dgm:layoutDef xmlns:dgm="http://schemas.openxmlformats.org/drawingml/2006/diagram" xmlns:a="http://schemas.openxmlformats.org/drawingml/2006/main" uniqueId="urn:microsoft.com/office/officeart/2008/layout/LinedList">
+  <dgm:title val=""/>
+  <dgm:desc val=""/>
+  <dgm:catLst>
+    <dgm:cat type="hierarchy" pri="8000"/>
+    <dgm:cat type="list" pri="2500"/>
+  </dgm:catLst>
+  <dgm:sampData>
+    <dgm:dataModel>
+      <dgm:ptLst>
+        <dgm:pt modelId="0" type="doc"/>
+        <dgm:pt modelId="1">
+          <dgm:prSet phldr="1"/>
+        </dgm:pt>
+        <dgm:pt modelId="11">
+          <dgm:prSet phldr="1"/>
+        </dgm:pt>
+        <dgm:pt modelId="12">
+          <dgm:prSet phldr="1"/>
+        </dgm:pt>
+        <dgm:pt modelId="13">
+          <dgm:prSet phldr="1"/>
+        </dgm:pt>
+      </dgm:ptLst>
+      <dgm:cxnLst>
+        <dgm:cxn modelId="2" srcId="0" destId="1" srcOrd="0" destOrd="0"/>
+        <dgm:cxn modelId="3" srcId="1" destId="11" srcOrd="0" destOrd="0"/>
+        <dgm:cxn modelId="4" srcId="1" destId="12" srcOrd="1" destOrd="0"/>
+        <dgm:cxn modelId="5" srcId="1" destId="13" srcOrd="2" destOrd="0"/>
+      </dgm:cxnLst>
+      <dgm:bg/>
+      <dgm:whole/>
+    </dgm:dataModel>
+  </dgm:sampData>
+  <dgm:styleData>
+    <dgm:dataModel>
+      <dgm:ptLst>
+        <dgm:pt modelId="0" type="doc"/>
+        <dgm:pt modelId="1">
+          <dgm:prSet phldr="1"/>
+        </dgm:pt>
+        <dgm:pt modelId="11">
+          <dgm:prSet phldr="1"/>
+        </dgm:pt>
+        <dgm:pt modelId="12">
+          <dgm:prSet phldr="1"/>
+        </dgm:pt>
+      </dgm:ptLst>
+      <dgm:cxnLst>
+        <dgm:cxn modelId="2" srcId="0" destId="1" srcOrd="0" destOrd="0"/>
+        <dgm:cxn modelId="3" srcId="1" destId="11" srcOrd="0" destOrd="0"/>
+        <dgm:cxn modelId="4" srcId="1" destId="12" srcOrd="1" destOrd="0"/>
+      </dgm:cxnLst>
+      <dgm:bg/>
+      <dgm:whole/>
+    </dgm:dataModel>
+  </dgm:styleData>
+  <dgm:clrData>
+    <dgm:dataModel>
+      <dgm:ptLst>
+        <dgm:pt modelId="0" type="doc"/>
+        <dgm:pt modelId="1">
+          <dgm:prSet phldr="1"/>
+        </dgm:pt>
+        <dgm:pt modelId="11">
+          <dgm:prSet phldr="1"/>
+        </dgm:pt>
+        <dgm:pt modelId="12">
+          <dgm:prSet phldr="1"/>
+        </dgm:pt>
+      </dgm:ptLst>
+      <dgm:cxnLst>
+        <dgm:cxn modelId="2" srcId="0" destId="1" srcOrd="0" destOrd="0"/>
+        <dgm:cxn modelId="3" srcId="1" destId="11" srcOrd="0" destOrd="0"/>
+        <dgm:cxn modelId="4" srcId="1" destId="12" srcOrd="1" destOrd="0"/>
+      </dgm:cxnLst>
+      <dgm:bg/>
+      <dgm:whole/>
+    </dgm:dataModel>
+  </dgm:clrData>
+  <dgm:layoutNode name="vert0">
+    <dgm:varLst>
+      <dgm:dir/>
+      <dgm:animOne val="branch"/>
+      <dgm:animLvl val="lvl"/>
+    </dgm:varLst>
+    <dgm:choose name="Name0">
+      <dgm:if name="Name1" func="var" arg="dir" op="equ" val="norm">
+        <dgm:alg type="lin">
+          <dgm:param type="linDir" val="fromT"/>
+          <dgm:param type="nodeHorzAlign" val="l"/>
+        </dgm:alg>
+      </dgm:if>
+      <dgm:else name="Name2">
+        <dgm:alg type="lin">
+          <dgm:param type="linDir" val="fromT"/>
+          <dgm:param type="nodeHorzAlign" val="r"/>
+        </dgm:alg>
+      </dgm:else>
+    </dgm:choose>
+    <dgm:shape xmlns:r="http://schemas.openxmlformats.org/officeDocument/2006/relationships" r:blip="">
+      <dgm:adjLst/>
+    </dgm:shape>
+    <dgm:presOf/>
+    <dgm:constrLst>
+      <dgm:constr type="w" for="ch" forName="horz1" refType="w"/>
+      <dgm:constr type="h" for="ch" forName="horz1" refType="h"/>
+      <dgm:constr type="h" for="des" forName="vert1" refType="h"/>
+      <dgm:constr type="h" for="des" forName="tx1" refType="h"/>
+      <dgm:constr type="h" for="des" forName="horz2" refType="h"/>
+      <dgm:constr type="h" for="des" forName="vert2" refType="h"/>
+      <dgm:constr type="h" for="des" forName="horz3" refType="h"/>
+      <dgm:constr type="h" for="des" forName="vert3" refType="h"/>
+      <dgm:constr type="h" for="des" forName="horz4" refType="h"/>
+      <dgm:constr type="h" for="des" ptType="node" refType="h"/>
+      <dgm:constr type="primFontSz" for="des" forName="tx1" op="equ" val="65"/>
+      <dgm:constr type="primFontSz" for="des" forName="tx2" op="equ" val="65"/>
+      <dgm:constr type="primFontSz" for="des" forName="tx3" op="equ" val="65"/>
+      <dgm:constr type="primFontSz" for="des" forName="tx4" op="equ" val="65"/>
+      <dgm:constr type="w" for="des" forName="thickLine" refType="w"/>
+      <dgm:constr type="h" for="des" forName="thickLine"/>
+      <dgm:constr type="h" for="des" forName="thinLine1"/>
+      <dgm:constr type="h" for="des" forName="thinLine2b"/>
+      <dgm:constr type="h" for="des" forName="thinLine3"/>
+      <dgm:constr type="h" for="des" forName="vertSpace2a" refType="h" fact="0.05"/>
+      <dgm:constr type="h" for="des" forName="vertSpace2b" refType="h" refFor="des" refForName="vertSpace2a"/>
+    </dgm:constrLst>
+    <dgm:forEach name="Name3" axis="ch" ptType="node">
+      <dgm:layoutNode name="thickLine" styleLbl="alignNode1">
+        <dgm:alg type="sp"/>
+        <dgm:shape xmlns:r="http://schemas.openxmlformats.org/officeDocument/2006/relationships" type="line" r:blip="">
+          <dgm:adjLst/>
+        </dgm:shape>
+        <dgm:presOf/>
+      </dgm:layoutNode>
+      <dgm:layoutNode name="horz1">
+        <dgm:choose name="Name4">
+          <dgm:if name="Name5" func="var" arg="dir" op="equ" val="norm">
+            <dgm:alg type="lin">
+              <dgm:param type="linDir" val="fromL"/>
+              <dgm:param type="nodeVertAlign" val="t"/>
+            </dgm:alg>
+          </dgm:if>
+          <dgm:else name="Name6">
+            <dgm:alg type="lin">
+              <dgm:param type="linDir" val="fromR"/>
+              <dgm:param type="nodeVertAlign" val="t"/>
+            </dgm:alg>
+          </dgm:else>
+        </dgm:choose>
+        <dgm:shape xmlns:r="http://schemas.openxmlformats.org/officeDocument/2006/relationships" r:blip="">
+          <dgm:adjLst/>
+        </dgm:shape>
+        <dgm:presOf/>
+        <dgm:choose name="Name7">
+          <dgm:if name="Name8" axis="root des" func="maxDepth" op="equ" val="1">
+            <dgm:constrLst>
+              <dgm:constr type="w" for="ch" forName="tx1" refType="w"/>
+            </dgm:constrLst>
+          </dgm:if>
+          <dgm:if name="Name9" axis="root des" func="maxDepth" op="equ" val="2">
+            <dgm:constrLst>
+              <dgm:constr type="w" for="ch" forName="tx1" refType="w" fact="0.2"/>
+              <dgm:constr type="w" for="des" forName="tx2" refType="w" fact="0.785"/>
+              <dgm:constr type="w" for="des" forName="horzSpace2" refType="w" fact="0.015"/>
+              <dgm:constr type="w" for="des" forName="thinLine2b" refType="w" fact="0.8"/>
+            </dgm:constrLst>
+          </dgm:if>
+          <dgm:if name="Name10" axis="root des" func="maxDepth" op="equ" val="3">
+            <dgm:constrLst>
+              <dgm:constr type="w" for="ch" forName="tx1" refType="w" fact="0.2"/>
+              <dgm:constr type="w" for="des" forName="tx2" refType="w" fact="0.385"/>
+              <dgm:constr type="w" for="des" forName="tx3" refType="w" fact="0.385"/>
+              <dgm:constr type="w" for="des" forName="horzSpace2" refType="w" fact="0.015"/>
+              <dgm:constr type="w" for="des" forName="horzSpace3" refType="w" fact="0.015"/>
+              <dgm:constr type="w" for="des" forName="thinLine2b" refType="w" fact="0.8"/>
+              <dgm:constr type="w" for="des" forName="thinLine3" refType="w" fact="0.385"/>
+            </dgm:constrLst>
+          </dgm:if>
+          <dgm:if name="Name11" axis="root des" func="maxDepth" op="gte" val="4">
+            <dgm:constrLst>
+              <dgm:constr type="w" for="ch" forName="tx1" refType="w" fact="0.2"/>
+              <dgm:constr type="w" for="des" forName="tx2" refType="w" fact="0.2516"/>
+              <dgm:constr type="w" for="des" forName="tx3" refType="w" fact="0.2516"/>
+              <dgm:constr type="w" for="des" forName="tx4" refType="w" fact="0.2516"/>
+              <dgm:constr type="w" for="des" forName="horzSpace2" refType="w" fact="0.015"/>
+              <dgm:constr type="w" for="des" forName="horzSpace3" refType="w" fact="0.015"/>
+              <dgm:constr type="w" for="des" forName="horzSpace4" refType="w" fact="0.015"/>
+              <dgm:constr type="w" for="des" forName="thinLine2b" refType="w" fact="0.8"/>
+              <dgm:constr type="w" for="des" forName="thinLine3" refType="w" fact="0.5332"/>
+            </dgm:constrLst>
+          </dgm:if>
+          <dgm:else name="Name12"/>
+        </dgm:choose>
+        <dgm:layoutNode name="tx1" styleLbl="revTx">
+          <dgm:alg type="tx">
+            <dgm:param type="parTxLTRAlign" val="l"/>
+            <dgm:param type="parTxRTLAlign" val="r"/>
+            <dgm:param type="txAnchorVert" val="t"/>
+          </dgm:alg>
+          <dgm:shape xmlns:r="http://schemas.openxmlformats.org/officeDocument/2006/relationships" type="rect" r:blip="">
+            <dgm:adjLst/>
+          </dgm:shape>
+          <dgm:presOf axis="self"/>
+          <dgm:constrLst>
+            <dgm:constr type="tMarg" refType="primFontSz" fact="0.3"/>
+            <dgm:constr type="bMarg" refType="primFontSz" fact="0.3"/>
+            <dgm:constr type="lMarg" refType="primFontSz" fact="0.3"/>
+            <dgm:constr type="rMarg" refType="primFontSz" fact="0.3"/>
+          </dgm:constrLst>
+          <dgm:ruleLst>
+            <dgm:rule type="primFontSz" val="5" fact="NaN" max="NaN"/>
+          </dgm:ruleLst>
+        </dgm:layoutNode>
+        <dgm:layoutNode name="vert1">
+          <dgm:choose name="Name13">
+            <dgm:if name="Name14" func="var" arg="dir" op="equ" val="norm">
+              <dgm:alg type="lin">
+                <dgm:param type="linDir" val="fromT"/>
+                <dgm:param type="nodeHorzAlign" val="l"/>
+              </dgm:alg>
+            </dgm:if>
+            <dgm:else name="Name15">
+              <dgm:alg type="lin">
+                <dgm:param type="linDir" val="fromT"/>
+                <dgm:param type="nodeHorzAlign" val="r"/>
+              </dgm:alg>
+            </dgm:else>
+          </dgm:choose>
+          <dgm:shape xmlns:r="http://schemas.openxmlformats.org/officeDocument/2006/relationships" r:blip="">
+            <dgm:adjLst/>
+          </dgm:shape>
+          <dgm:presOf/>
+          <dgm:forEach name="Name16" axis="ch" ptType="node">
+            <dgm:choose name="Name17">
+              <dgm:if name="Name18" axis="self" ptType="node" func="pos" op="equ" val="1">
+                <dgm:layoutNode name="vertSpace2a">
+                  <dgm:alg type="sp"/>
+                  <dgm:shape xmlns:r="http://schemas.openxmlformats.org/officeDocument/2006/relationships" r:blip="">
+                    <dgm:adjLst/>
+                  </dgm:shape>
+                  <dgm:presOf/>
+                </dgm:layoutNode>
+              </dgm:if>
+              <dgm:else name="Name19"/>
+            </dgm:choose>
+            <dgm:layoutNode name="horz2">
+              <dgm:choose name="Name20">
+                <dgm:if name="Name21" func="var" arg="dir" op="equ" val="norm">
+                  <dgm:alg type="lin">
+                    <dgm:param type="linDir" val="fromL"/>
+                    <dgm:param type="nodeVertAlign" val="t"/>
+                  </dgm:alg>
+                </dgm:if>
+                <dgm:else name="Name22">
+                  <dgm:alg type="lin">
+                    <dgm:param type="linDir" val="fromR"/>
+                    <dgm:param type="nodeVertAlign" val="t"/>
+                  </dgm:alg>
+                </dgm:else>
+              </dgm:choose>
+              <dgm:shape xmlns:r="http://schemas.openxmlformats.org/officeDocument/2006/relationships" r:blip="">
+                <dgm:adjLst/>
+              </dgm:shape>
+              <dgm:presOf/>
+              <dgm:layoutNode name="horzSpace2">
+                <dgm:alg type="sp"/>
+                <dgm:shape xmlns:r="http://schemas.openxmlformats.org/officeDocument/2006/relationships" r:blip="">
+                  <dgm:adjLst/>
+                </dgm:shape>
+                <dgm:presOf/>
+              </dgm:layoutNode>
+              <dgm:layoutNode name="tx2" styleLbl="revTx">
+                <dgm:alg type="tx">
+                  <dgm:param type="parTxLTRAlign" val="l"/>
+                  <dgm:param type="parTxRTLAlign" val="r"/>
+                  <dgm:param type="txAnchorVert" val="t"/>
+                </dgm:alg>
+                <dgm:shape xmlns:r="http://schemas.openxmlformats.org/officeDocument/2006/relationships" type="rect" r:blip="">
+                  <dgm:adjLst/>
+                </dgm:shape>
+                <dgm:presOf axis="self"/>
+                <dgm:constrLst>
+                  <dgm:constr type="tMarg" refType="primFontSz" fact="0.3"/>
+                  <dgm:constr type="bMarg" refType="primFontSz" fact="0.3"/>
+                  <dgm:constr type="lMarg" refType="primFontSz" fact="0.3"/>
+                  <dgm:constr type="rMarg" refType="primFontSz" fact="0.3"/>
+                </dgm:constrLst>
+                <dgm:ruleLst>
+                  <dgm:rule type="primFontSz" val="5" fact="NaN" max="NaN"/>
+                </dgm:ruleLst>
+              </dgm:layoutNode>
+              <dgm:layoutNode name="vert2">
+                <dgm:choose name="Name23">
+                  <dgm:if name="Name24" func="var" arg="dir" op="equ" val="norm">
+                    <dgm:alg type="lin">
+                      <dgm:param type="linDir" val="fromT"/>
+                      <dgm:param type="nodeHorzAlign" val="l"/>
+                    </dgm:alg>
+                  </dgm:if>
+                  <dgm:else name="Name25">
+                    <dgm:alg type="lin">
+                      <dgm:param type="linDir" val="fromT"/>
+                      <dgm:param type="nodeHorzAlign" val="r"/>
+                    </dgm:alg>
+                  </dgm:else>
+                </dgm:choose>
+                <dgm:shape xmlns:r="http://schemas.openxmlformats.org/officeDocument/2006/relationships" r:blip="">
+                  <dgm:adjLst/>
+                </dgm:shape>
+                <dgm:presOf/>
+                <dgm:forEach name="Name26" axis="ch" ptType="node">
+                  <dgm:layoutNode name="horz3">
+                    <dgm:choose name="Name27">
+                      <dgm:if name="Name28" func="var" arg="dir" op="equ" val="norm">
+                        <dgm:alg type="lin">
+                          <dgm:param type="linDir" val="fromL"/>
+                          <dgm:param type="nodeVertAlign" val="t"/>
+                        </dgm:alg>
+                      </dgm:if>
+                      <dgm:else name="Name29">
+                        <dgm:alg type="lin">
+                          <dgm:param type="linDir" val="fromR"/>
+                          <dgm:param type="nodeVertAlign" val="t"/>
+                        </dgm:alg>
+                      </dgm:else>
+                    </dgm:choose>
+                    <dgm:shape xmlns:r="http://schemas.openxmlformats.org/officeDocument/2006/relationships" r:blip="">
+                      <dgm:adjLst/>
+                    </dgm:shape>
+                    <dgm:presOf/>
+                    <dgm:layoutNode name="horzSpace3">
+                      <dgm:alg type="sp"/>
+                      <dgm:shape xmlns:r="http://schemas.openxmlformats.org/officeDocument/2006/relationships" r:blip="">
+                        <dgm:adjLst/>
+                      </dgm:shape>
+                      <dgm:presOf/>
+                    </dgm:layoutNode>
+                    <dgm:layoutNode name="tx3" styleLbl="revTx">
+                      <dgm:alg type="tx">
+                        <dgm:param type="parTxLTRAlign" val="l"/>
+                        <dgm:param type="parTxRTLAlign" val="r"/>
+                        <dgm:param type="txAnchorVert" val="t"/>
+                      </dgm:alg>
+                      <dgm:shape xmlns:r="http://schemas.openxmlformats.org/officeDocument/2006/relationships" type="rect" r:blip="">
+                        <dgm:adjLst/>
+                      </dgm:shape>
+                      <dgm:presOf axis="self"/>
+                      <dgm:constrLst>
+                        <dgm:constr type="tMarg" refType="primFontSz" fact="0.3"/>
+                        <dgm:constr type="bMarg" refType="primFontSz" fact="0.3"/>
+                        <dgm:constr type="lMarg" refType="primFontSz" fact="0.3"/>
+                        <dgm:constr type="rMarg" refType="primFontSz" fact="0.3"/>
+                      </dgm:constrLst>
+                      <dgm:ruleLst>
+                        <dgm:rule type="primFontSz" val="5" fact="NaN" max="NaN"/>
+                      </dgm:ruleLst>
+                    </dgm:layoutNode>
+                    <dgm:layoutNode name="vert3">
+                      <dgm:choose name="Name30">
+                        <dgm:if name="Name31" func="var" arg="dir" op="equ" val="norm">
+                          <dgm:alg type="lin">
+                            <dgm:param type="linDir" val="fromT"/>
+                            <dgm:param type="nodeHorzAlign" val="l"/>
+                          </dgm:alg>
+                        </dgm:if>
+                        <dgm:else name="Name32">
+                          <dgm:alg type="lin">
+                            <dgm:param type="linDir" val="fromT"/>
+                            <dgm:param type="nodeHorzAlign" val="r"/>
+                          </dgm:alg>
+                        </dgm:else>
+                      </dgm:choose>
+                      <dgm:shape xmlns:r="http://schemas.openxmlformats.org/officeDocument/2006/relationships" r:blip="">
+                        <dgm:adjLst/>
+                      </dgm:shape>
+                      <dgm:presOf/>
+                      <dgm:forEach name="Name33" axis="ch" ptType="node">
+                        <dgm:layoutNode name="horz4">
+                          <dgm:choose name="Name34">
+                            <dgm:if name="Name35" func="var" arg="dir" op="equ" val="norm">
+                              <dgm:alg type="lin">
+                                <dgm:param type="linDir" val="fromL"/>
+                                <dgm:param type="nodeVertAlign" val="t"/>
+                              </dgm:alg>
+                            </dgm:if>
+                            <dgm:else name="Name36">
+                              <dgm:alg type="lin">
+                                <dgm:param type="linDir" val="fromR"/>
+                                <dgm:param type="nodeVertAlign" val="t"/>
+                              </dgm:alg>
+                            </dgm:else>
+                          </dgm:choose>
+                          <dgm:shape xmlns:r="http://schemas.openxmlformats.org/officeDocument/2006/relationships" r:blip="">
+                            <dgm:adjLst/>
+                          </dgm:shape>
+                          <dgm:presOf/>
+                          <dgm:layoutNode name="horzSpace4">
+                            <dgm:alg type="sp"/>
+                            <dgm:shape xmlns:r="http://schemas.openxmlformats.org/officeDocument/2006/relationships" r:blip="">
+                              <dgm:adjLst/>
+                            </dgm:shape>
+                            <dgm:presOf/>
+                          </dgm:layoutNode>
+                          <dgm:layoutNode name="tx4" styleLbl="revTx">
+                            <dgm:varLst>
+                              <dgm:bulletEnabled val="1"/>
+                            </dgm:varLst>
+                            <dgm:alg type="tx">
+                              <dgm:param type="parTxLTRAlign" val="l"/>
+                              <dgm:param type="parTxRTLAlign" val="r"/>
+                              <dgm:param type="txAnchorVert" val="t"/>
+                            </dgm:alg>
+                            <dgm:shape xmlns:r="http://schemas.openxmlformats.org/officeDocument/2006/relationships" type="rect" r:blip="">
+                              <dgm:adjLst/>
+                            </dgm:shape>
+                            <dgm:presOf axis="desOrSelf" ptType="node"/>
+                            <dgm:constrLst>
+                              <dgm:constr type="tMarg" refType="primFontSz" fact="0.3"/>
+                              <dgm:constr type="bMarg" refType="primFontSz" fact="0.3"/>
+                              <dgm:constr type="lMarg" refType="primFontSz" fact="0.3"/>
+                              <dgm:constr type="rMarg" refType="primFontSz" fact="0.3"/>
+                            </dgm:constrLst>
+                            <dgm:ruleLst>
+                              <dgm:rule type="primFontSz" val="5" fact="NaN" max="NaN"/>
+                            </dgm:ruleLst>
+                          </dgm:layoutNode>
+                        </dgm:layoutNode>
+                      </dgm:forEach>
+                    </dgm:layoutNode>
+                  </dgm:layoutNode>
+                  <dgm:forEach name="Name37" axis="followSib" ptType="sibTrans" cnt="1">
+                    <dgm:layoutNode name="thinLine3" styleLbl="callout">
+                      <dgm:alg type="sp"/>
+                      <dgm:shape xmlns:r="http://schemas.openxmlformats.org/officeDocument/2006/relationships" type="line" r:blip="">
+                        <dgm:adjLst/>
+                      </dgm:shape>
+                      <dgm:presOf/>
+                    </dgm:layoutNode>
+                  </dgm:forEach>
+                </dgm:forEach>
+              </dgm:layoutNode>
+            </dgm:layoutNode>
+            <dgm:layoutNode name="thinLine2b" styleLbl="callout">
+              <dgm:alg type="sp"/>
+              <dgm:shape xmlns:r="http://schemas.openxmlformats.org/officeDocument/2006/relationships" type="line" r:blip="">
+                <dgm:adjLst/>
+              </dgm:shape>
+              <dgm:presOf/>
+            </dgm:layoutNode>
+            <dgm:layoutNode name="vertSpace2b">
+              <dgm:alg type="sp"/>
+              <dgm:shape xmlns:r="http://schemas.openxmlformats.org/officeDocument/2006/relationships" r:blip="">
+                <dgm:adjLst/>
+              </dgm:shape>
+              <dgm:presOf/>
+            </dgm:layoutNode>
+          </dgm:forEach>
+        </dgm:layoutNode>
+      </dgm:layoutNode>
+    </dgm:forEach>
+  </dgm:layoutNode>
+</dgm:layoutDef>
+</file>
+
 <file path=ppt/diagrams/quickStyle1.xml><?xml version="1.0" encoding="utf-8"?>
 <dgm:styleDef xmlns:dgm="http://schemas.openxmlformats.org/drawingml/2006/diagram" xmlns:a="http://schemas.openxmlformats.org/drawingml/2006/main" uniqueId="urn:microsoft.com/office/officeart/2005/8/quickstyle/simple1">
   <dgm:title val=""/>
@@ -9379,6 +11562,1040 @@
 </file>
 
 <file path=ppt/diagrams/quickStyle3.xml><?xml version="1.0" encoding="utf-8"?>
+<dgm:styleDef xmlns:dgm="http://schemas.openxmlformats.org/drawingml/2006/diagram" xmlns:a="http://schemas.openxmlformats.org/drawingml/2006/main" uniqueId="urn:microsoft.com/office/officeart/2005/8/quickstyle/simple1">
+  <dgm:title val=""/>
+  <dgm:desc val=""/>
+  <dgm:catLst>
+    <dgm:cat type="simple" pri="10100"/>
+  </dgm:catLst>
+  <dgm:scene3d>
+    <a:camera prst="orthographicFront"/>
+    <a:lightRig rig="threePt" dir="t"/>
+  </dgm:scene3d>
+  <dgm:styleLbl name="node0">
+    <dgm:scene3d>
+      <a:camera prst="orthographicFront"/>
+      <a:lightRig rig="threePt" dir="t"/>
+    </dgm:scene3d>
+    <dgm:sp3d/>
+    <dgm:txPr/>
+    <dgm:style>
+      <a:lnRef idx="2">
+        <a:scrgbClr r="0" g="0" b="0"/>
+      </a:lnRef>
+      <a:fillRef idx="1">
+        <a:scrgbClr r="0" g="0" b="0"/>
+      </a:fillRef>
+      <a:effectRef idx="0">
+        <a:scrgbClr r="0" g="0" b="0"/>
+      </a:effectRef>
+      <a:fontRef idx="minor">
+        <a:schemeClr val="lt1"/>
+      </a:fontRef>
+    </dgm:style>
+  </dgm:styleLbl>
+  <dgm:styleLbl name="lnNode1">
+    <dgm:scene3d>
+      <a:camera prst="orthographicFront"/>
+      <a:lightRig rig="threePt" dir="t"/>
+    </dgm:scene3d>
+    <dgm:sp3d/>
+    <dgm:txPr/>
+    <dgm:style>
+      <a:lnRef idx="2">
+        <a:scrgbClr r="0" g="0" b="0"/>
+      </a:lnRef>
+      <a:fillRef idx="1">
+        <a:scrgbClr r="0" g="0" b="0"/>
+      </a:fillRef>
+      <a:effectRef idx="0">
+        <a:scrgbClr r="0" g="0" b="0"/>
+      </a:effectRef>
+      <a:fontRef idx="minor">
+        <a:schemeClr val="lt1"/>
+      </a:fontRef>
+    </dgm:style>
+  </dgm:styleLbl>
+  <dgm:styleLbl name="vennNode1">
+    <dgm:scene3d>
+      <a:camera prst="orthographicFront"/>
+      <a:lightRig rig="threePt" dir="t"/>
+    </dgm:scene3d>
+    <dgm:sp3d/>
+    <dgm:txPr/>
+    <dgm:style>
+      <a:lnRef idx="2">
+        <a:scrgbClr r="0" g="0" b="0"/>
+      </a:lnRef>
+      <a:fillRef idx="1">
+        <a:scrgbClr r="0" g="0" b="0"/>
+      </a:fillRef>
+      <a:effectRef idx="0">
+        <a:scrgbClr r="0" g="0" b="0"/>
+      </a:effectRef>
+      <a:fontRef idx="minor">
+        <a:schemeClr val="tx1"/>
+      </a:fontRef>
+    </dgm:style>
+  </dgm:styleLbl>
+  <dgm:styleLbl name="alignNode1">
+    <dgm:scene3d>
+      <a:camera prst="orthographicFront"/>
+      <a:lightRig rig="threePt" dir="t"/>
+    </dgm:scene3d>
+    <dgm:sp3d/>
+    <dgm:txPr/>
+    <dgm:style>
+      <a:lnRef idx="2">
+        <a:scrgbClr r="0" g="0" b="0"/>
+      </a:lnRef>
+      <a:fillRef idx="1">
+        <a:scrgbClr r="0" g="0" b="0"/>
+      </a:fillRef>
+      <a:effectRef idx="0">
+        <a:scrgbClr r="0" g="0" b="0"/>
+      </a:effectRef>
+      <a:fontRef idx="minor">
+        <a:schemeClr val="lt1"/>
+      </a:fontRef>
+    </dgm:style>
+  </dgm:styleLbl>
+  <dgm:styleLbl name="node1">
+    <dgm:scene3d>
+      <a:camera prst="orthographicFront"/>
+      <a:lightRig rig="threePt" dir="t"/>
+    </dgm:scene3d>
+    <dgm:sp3d/>
+    <dgm:txPr/>
+    <dgm:style>
+      <a:lnRef idx="2">
+        <a:scrgbClr r="0" g="0" b="0"/>
+      </a:lnRef>
+      <a:fillRef idx="1">
+        <a:scrgbClr r="0" g="0" b="0"/>
+      </a:fillRef>
+      <a:effectRef idx="0">
+        <a:scrgbClr r="0" g="0" b="0"/>
+      </a:effectRef>
+      <a:fontRef idx="minor">
+        <a:schemeClr val="lt1"/>
+      </a:fontRef>
+    </dgm:style>
+  </dgm:styleLbl>
+  <dgm:styleLbl name="node2">
+    <dgm:scene3d>
+      <a:camera prst="orthographicFront"/>
+      <a:lightRig rig="threePt" dir="t"/>
+    </dgm:scene3d>
+    <dgm:sp3d/>
+    <dgm:txPr/>
+    <dgm:style>
+      <a:lnRef idx="2">
+        <a:scrgbClr r="0" g="0" b="0"/>
+      </a:lnRef>
+      <a:fillRef idx="1">
+        <a:scrgbClr r="0" g="0" b="0"/>
+      </a:fillRef>
+      <a:effectRef idx="0">
+        <a:scrgbClr r="0" g="0" b="0"/>
+      </a:effectRef>
+      <a:fontRef idx="minor">
+        <a:schemeClr val="lt1"/>
+      </a:fontRef>
+    </dgm:style>
+  </dgm:styleLbl>
+  <dgm:styleLbl name="node3">
+    <dgm:scene3d>
+      <a:camera prst="orthographicFront"/>
+      <a:lightRig rig="threePt" dir="t"/>
+    </dgm:scene3d>
+    <dgm:sp3d/>
+    <dgm:txPr/>
+    <dgm:style>
+      <a:lnRef idx="2">
+        <a:scrgbClr r="0" g="0" b="0"/>
+      </a:lnRef>
+      <a:fillRef idx="1">
+        <a:scrgbClr r="0" g="0" b="0"/>
+      </a:fillRef>
+      <a:effectRef idx="0">
+        <a:scrgbClr r="0" g="0" b="0"/>
+      </a:effectRef>
+      <a:fontRef idx="minor">
+        <a:schemeClr val="lt1"/>
+      </a:fontRef>
+    </dgm:style>
+  </dgm:styleLbl>
+  <dgm:styleLbl name="node4">
+    <dgm:scene3d>
+      <a:camera prst="orthographicFront"/>
+      <a:lightRig rig="threePt" dir="t"/>
+    </dgm:scene3d>
+    <dgm:sp3d/>
+    <dgm:txPr/>
+    <dgm:style>
+      <a:lnRef idx="2">
+        <a:scrgbClr r="0" g="0" b="0"/>
+      </a:lnRef>
+      <a:fillRef idx="1">
+        <a:scrgbClr r="0" g="0" b="0"/>
+      </a:fillRef>
+      <a:effectRef idx="0">
+        <a:scrgbClr r="0" g="0" b="0"/>
+      </a:effectRef>
+      <a:fontRef idx="minor">
+        <a:schemeClr val="lt1"/>
+      </a:fontRef>
+    </dgm:style>
+  </dgm:styleLbl>
+  <dgm:styleLbl name="fgImgPlace1">
+    <dgm:scene3d>
+      <a:camera prst="orthographicFront"/>
+      <a:lightRig rig="threePt" dir="t"/>
+    </dgm:scene3d>
+    <dgm:sp3d/>
+    <dgm:txPr/>
+    <dgm:style>
+      <a:lnRef idx="2">
+        <a:scrgbClr r="0" g="0" b="0"/>
+      </a:lnRef>
+      <a:fillRef idx="1">
+        <a:scrgbClr r="0" g="0" b="0"/>
+      </a:fillRef>
+      <a:effectRef idx="0">
+        <a:scrgbClr r="0" g="0" b="0"/>
+      </a:effectRef>
+      <a:fontRef idx="minor"/>
+    </dgm:style>
+  </dgm:styleLbl>
+  <dgm:styleLbl name="alignImgPlace1">
+    <dgm:scene3d>
+      <a:camera prst="orthographicFront"/>
+      <a:lightRig rig="threePt" dir="t"/>
+    </dgm:scene3d>
+    <dgm:sp3d/>
+    <dgm:txPr/>
+    <dgm:style>
+      <a:lnRef idx="2">
+        <a:scrgbClr r="0" g="0" b="0"/>
+      </a:lnRef>
+      <a:fillRef idx="1">
+        <a:scrgbClr r="0" g="0" b="0"/>
+      </a:fillRef>
+      <a:effectRef idx="0">
+        <a:scrgbClr r="0" g="0" b="0"/>
+      </a:effectRef>
+      <a:fontRef idx="minor"/>
+    </dgm:style>
+  </dgm:styleLbl>
+  <dgm:styleLbl name="bgImgPlace1">
+    <dgm:scene3d>
+      <a:camera prst="orthographicFront"/>
+      <a:lightRig rig="threePt" dir="t"/>
+    </dgm:scene3d>
+    <dgm:sp3d/>
+    <dgm:txPr/>
+    <dgm:style>
+      <a:lnRef idx="2">
+        <a:scrgbClr r="0" g="0" b="0"/>
+      </a:lnRef>
+      <a:fillRef idx="1">
+        <a:scrgbClr r="0" g="0" b="0"/>
+      </a:fillRef>
+      <a:effectRef idx="0">
+        <a:scrgbClr r="0" g="0" b="0"/>
+      </a:effectRef>
+      <a:fontRef idx="minor"/>
+    </dgm:style>
+  </dgm:styleLbl>
+  <dgm:styleLbl name="sibTrans2D1">
+    <dgm:scene3d>
+      <a:camera prst="orthographicFront"/>
+      <a:lightRig rig="threePt" dir="t"/>
+    </dgm:scene3d>
+    <dgm:sp3d/>
+    <dgm:txPr/>
+    <dgm:style>
+      <a:lnRef idx="0">
+        <a:scrgbClr r="0" g="0" b="0"/>
+      </a:lnRef>
+      <a:fillRef idx="1">
+        <a:scrgbClr r="0" g="0" b="0"/>
+      </a:fillRef>
+      <a:effectRef idx="0">
+        <a:scrgbClr r="0" g="0" b="0"/>
+      </a:effectRef>
+      <a:fontRef idx="minor">
+        <a:schemeClr val="lt1"/>
+      </a:fontRef>
+    </dgm:style>
+  </dgm:styleLbl>
+  <dgm:styleLbl name="fgSibTrans2D1">
+    <dgm:scene3d>
+      <a:camera prst="orthographicFront"/>
+      <a:lightRig rig="threePt" dir="t"/>
+    </dgm:scene3d>
+    <dgm:sp3d/>
+    <dgm:txPr/>
+    <dgm:style>
+      <a:lnRef idx="0">
+        <a:scrgbClr r="0" g="0" b="0"/>
+      </a:lnRef>
+      <a:fillRef idx="1">
+        <a:scrgbClr r="0" g="0" b="0"/>
+      </a:fillRef>
+      <a:effectRef idx="0">
+        <a:scrgbClr r="0" g="0" b="0"/>
+      </a:effectRef>
+      <a:fontRef idx="minor">
+        <a:schemeClr val="lt1"/>
+      </a:fontRef>
+    </dgm:style>
+  </dgm:styleLbl>
+  <dgm:styleLbl name="bgSibTrans2D1">
+    <dgm:scene3d>
+      <a:camera prst="orthographicFront"/>
+      <a:lightRig rig="threePt" dir="t"/>
+    </dgm:scene3d>
+    <dgm:sp3d/>
+    <dgm:txPr/>
+    <dgm:style>
+      <a:lnRef idx="0">
+        <a:scrgbClr r="0" g="0" b="0"/>
+      </a:lnRef>
+      <a:fillRef idx="1">
+        <a:scrgbClr r="0" g="0" b="0"/>
+      </a:fillRef>
+      <a:effectRef idx="0">
+        <a:scrgbClr r="0" g="0" b="0"/>
+      </a:effectRef>
+      <a:fontRef idx="minor">
+        <a:schemeClr val="lt1"/>
+      </a:fontRef>
+    </dgm:style>
+  </dgm:styleLbl>
+  <dgm:styleLbl name="sibTrans1D1">
+    <dgm:scene3d>
+      <a:camera prst="orthographicFront"/>
+      <a:lightRig rig="threePt" dir="t"/>
+    </dgm:scene3d>
+    <dgm:sp3d/>
+    <dgm:txPr/>
+    <dgm:style>
+      <a:lnRef idx="1">
+        <a:scrgbClr r="0" g="0" b="0"/>
+      </a:lnRef>
+      <a:fillRef idx="0">
+        <a:scrgbClr r="0" g="0" b="0"/>
+      </a:fillRef>
+      <a:effectRef idx="0">
+        <a:scrgbClr r="0" g="0" b="0"/>
+      </a:effectRef>
+      <a:fontRef idx="minor"/>
+    </dgm:style>
+  </dgm:styleLbl>
+  <dgm:styleLbl name="callout">
+    <dgm:scene3d>
+      <a:camera prst="orthographicFront"/>
+      <a:lightRig rig="threePt" dir="t"/>
+    </dgm:scene3d>
+    <dgm:sp3d/>
+    <dgm:txPr/>
+    <dgm:style>
+      <a:lnRef idx="2">
+        <a:scrgbClr r="0" g="0" b="0"/>
+      </a:lnRef>
+      <a:fillRef idx="1">
+        <a:scrgbClr r="0" g="0" b="0"/>
+      </a:fillRef>
+      <a:effectRef idx="0">
+        <a:scrgbClr r="0" g="0" b="0"/>
+      </a:effectRef>
+      <a:fontRef idx="minor"/>
+    </dgm:style>
+  </dgm:styleLbl>
+  <dgm:styleLbl name="asst0">
+    <dgm:scene3d>
+      <a:camera prst="orthographicFront"/>
+      <a:lightRig rig="threePt" dir="t"/>
+    </dgm:scene3d>
+    <dgm:sp3d/>
+    <dgm:txPr/>
+    <dgm:style>
+      <a:lnRef idx="2">
+        <a:scrgbClr r="0" g="0" b="0"/>
+      </a:lnRef>
+      <a:fillRef idx="1">
+        <a:scrgbClr r="0" g="0" b="0"/>
+      </a:fillRef>
+      <a:effectRef idx="0">
+        <a:scrgbClr r="0" g="0" b="0"/>
+      </a:effectRef>
+      <a:fontRef idx="minor">
+        <a:schemeClr val="lt1"/>
+      </a:fontRef>
+    </dgm:style>
+  </dgm:styleLbl>
+  <dgm:styleLbl name="asst1">
+    <dgm:scene3d>
+      <a:camera prst="orthographicFront"/>
+      <a:lightRig rig="threePt" dir="t"/>
+    </dgm:scene3d>
+    <dgm:sp3d/>
+    <dgm:txPr/>
+    <dgm:style>
+      <a:lnRef idx="2">
+        <a:scrgbClr r="0" g="0" b="0"/>
+      </a:lnRef>
+      <a:fillRef idx="1">
+        <a:scrgbClr r="0" g="0" b="0"/>
+      </a:fillRef>
+      <a:effectRef idx="0">
+        <a:scrgbClr r="0" g="0" b="0"/>
+      </a:effectRef>
+      <a:fontRef idx="minor">
+        <a:schemeClr val="lt1"/>
+      </a:fontRef>
+    </dgm:style>
+  </dgm:styleLbl>
+  <dgm:styleLbl name="asst2">
+    <dgm:scene3d>
+      <a:camera prst="orthographicFront"/>
+      <a:lightRig rig="threePt" dir="t"/>
+    </dgm:scene3d>
+    <dgm:sp3d/>
+    <dgm:txPr/>
+    <dgm:style>
+      <a:lnRef idx="2">
+        <a:scrgbClr r="0" g="0" b="0"/>
+      </a:lnRef>
+      <a:fillRef idx="1">
+        <a:scrgbClr r="0" g="0" b="0"/>
+      </a:fillRef>
+      <a:effectRef idx="0">
+        <a:scrgbClr r="0" g="0" b="0"/>
+      </a:effectRef>
+      <a:fontRef idx="minor">
+        <a:schemeClr val="lt1"/>
+      </a:fontRef>
+    </dgm:style>
+  </dgm:styleLbl>
+  <dgm:styleLbl name="asst3">
+    <dgm:scene3d>
+      <a:camera prst="orthographicFront"/>
+      <a:lightRig rig="threePt" dir="t"/>
+    </dgm:scene3d>
+    <dgm:sp3d/>
+    <dgm:txPr/>
+    <dgm:style>
+      <a:lnRef idx="2">
+        <a:scrgbClr r="0" g="0" b="0"/>
+      </a:lnRef>
+      <a:fillRef idx="1">
+        <a:scrgbClr r="0" g="0" b="0"/>
+      </a:fillRef>
+      <a:effectRef idx="0">
+        <a:scrgbClr r="0" g="0" b="0"/>
+      </a:effectRef>
+      <a:fontRef idx="minor">
+        <a:schemeClr val="lt1"/>
+      </a:fontRef>
+    </dgm:style>
+  </dgm:styleLbl>
+  <dgm:styleLbl name="asst4">
+    <dgm:scene3d>
+      <a:camera prst="orthographicFront"/>
+      <a:lightRig rig="threePt" dir="t"/>
+    </dgm:scene3d>
+    <dgm:sp3d/>
+    <dgm:txPr/>
+    <dgm:style>
+      <a:lnRef idx="2">
+        <a:scrgbClr r="0" g="0" b="0"/>
+      </a:lnRef>
+      <a:fillRef idx="1">
+        <a:scrgbClr r="0" g="0" b="0"/>
+      </a:fillRef>
+      <a:effectRef idx="0">
+        <a:scrgbClr r="0" g="0" b="0"/>
+      </a:effectRef>
+      <a:fontRef idx="minor">
+        <a:schemeClr val="lt1"/>
+      </a:fontRef>
+    </dgm:style>
+  </dgm:styleLbl>
+  <dgm:styleLbl name="parChTrans2D1">
+    <dgm:scene3d>
+      <a:camera prst="orthographicFront"/>
+      <a:lightRig rig="threePt" dir="t"/>
+    </dgm:scene3d>
+    <dgm:sp3d/>
+    <dgm:txPr/>
+    <dgm:style>
+      <a:lnRef idx="2">
+        <a:scrgbClr r="0" g="0" b="0"/>
+      </a:lnRef>
+      <a:fillRef idx="1">
+        <a:scrgbClr r="0" g="0" b="0"/>
+      </a:fillRef>
+      <a:effectRef idx="0">
+        <a:scrgbClr r="0" g="0" b="0"/>
+      </a:effectRef>
+      <a:fontRef idx="minor">
+        <a:schemeClr val="lt1"/>
+      </a:fontRef>
+    </dgm:style>
+  </dgm:styleLbl>
+  <dgm:styleLbl name="parChTrans2D2">
+    <dgm:scene3d>
+      <a:camera prst="orthographicFront"/>
+      <a:lightRig rig="threePt" dir="t"/>
+    </dgm:scene3d>
+    <dgm:sp3d/>
+    <dgm:txPr/>
+    <dgm:style>
+      <a:lnRef idx="2">
+        <a:scrgbClr r="0" g="0" b="0"/>
+      </a:lnRef>
+      <a:fillRef idx="1">
+        <a:scrgbClr r="0" g="0" b="0"/>
+      </a:fillRef>
+      <a:effectRef idx="0">
+        <a:scrgbClr r="0" g="0" b="0"/>
+      </a:effectRef>
+      <a:fontRef idx="minor">
+        <a:schemeClr val="lt1"/>
+      </a:fontRef>
+    </dgm:style>
+  </dgm:styleLbl>
+  <dgm:styleLbl name="parChTrans2D3">
+    <dgm:scene3d>
+      <a:camera prst="orthographicFront"/>
+      <a:lightRig rig="threePt" dir="t"/>
+    </dgm:scene3d>
+    <dgm:sp3d/>
+    <dgm:txPr/>
+    <dgm:style>
+      <a:lnRef idx="2">
+        <a:scrgbClr r="0" g="0" b="0"/>
+      </a:lnRef>
+      <a:fillRef idx="1">
+        <a:scrgbClr r="0" g="0" b="0"/>
+      </a:fillRef>
+      <a:effectRef idx="0">
+        <a:scrgbClr r="0" g="0" b="0"/>
+      </a:effectRef>
+      <a:fontRef idx="minor">
+        <a:schemeClr val="lt1"/>
+      </a:fontRef>
+    </dgm:style>
+  </dgm:styleLbl>
+  <dgm:styleLbl name="parChTrans2D4">
+    <dgm:scene3d>
+      <a:camera prst="orthographicFront"/>
+      <a:lightRig rig="threePt" dir="t"/>
+    </dgm:scene3d>
+    <dgm:sp3d/>
+    <dgm:txPr/>
+    <dgm:style>
+      <a:lnRef idx="2">
+        <a:scrgbClr r="0" g="0" b="0"/>
+      </a:lnRef>
+      <a:fillRef idx="1">
+        <a:scrgbClr r="0" g="0" b="0"/>
+      </a:fillRef>
+      <a:effectRef idx="0">
+        <a:scrgbClr r="0" g="0" b="0"/>
+      </a:effectRef>
+      <a:fontRef idx="minor">
+        <a:schemeClr val="lt1"/>
+      </a:fontRef>
+    </dgm:style>
+  </dgm:styleLbl>
+  <dgm:styleLbl name="parChTrans1D1">
+    <dgm:scene3d>
+      <a:camera prst="orthographicFront"/>
+      <a:lightRig rig="threePt" dir="t"/>
+    </dgm:scene3d>
+    <dgm:sp3d/>
+    <dgm:txPr/>
+    <dgm:style>
+      <a:lnRef idx="2">
+        <a:scrgbClr r="0" g="0" b="0"/>
+      </a:lnRef>
+      <a:fillRef idx="0">
+        <a:scrgbClr r="0" g="0" b="0"/>
+      </a:fillRef>
+      <a:effectRef idx="0">
+        <a:scrgbClr r="0" g="0" b="0"/>
+      </a:effectRef>
+      <a:fontRef idx="minor"/>
+    </dgm:style>
+  </dgm:styleLbl>
+  <dgm:styleLbl name="parChTrans1D2">
+    <dgm:scene3d>
+      <a:camera prst="orthographicFront"/>
+      <a:lightRig rig="threePt" dir="t"/>
+    </dgm:scene3d>
+    <dgm:sp3d/>
+    <dgm:txPr/>
+    <dgm:style>
+      <a:lnRef idx="2">
+        <a:scrgbClr r="0" g="0" b="0"/>
+      </a:lnRef>
+      <a:fillRef idx="0">
+        <a:scrgbClr r="0" g="0" b="0"/>
+      </a:fillRef>
+      <a:effectRef idx="0">
+        <a:scrgbClr r="0" g="0" b="0"/>
+      </a:effectRef>
+      <a:fontRef idx="minor"/>
+    </dgm:style>
+  </dgm:styleLbl>
+  <dgm:styleLbl name="parChTrans1D3">
+    <dgm:scene3d>
+      <a:camera prst="orthographicFront"/>
+      <a:lightRig rig="threePt" dir="t"/>
+    </dgm:scene3d>
+    <dgm:sp3d/>
+    <dgm:txPr/>
+    <dgm:style>
+      <a:lnRef idx="2">
+        <a:scrgbClr r="0" g="0" b="0"/>
+      </a:lnRef>
+      <a:fillRef idx="0">
+        <a:scrgbClr r="0" g="0" b="0"/>
+      </a:fillRef>
+      <a:effectRef idx="0">
+        <a:scrgbClr r="0" g="0" b="0"/>
+      </a:effectRef>
+      <a:fontRef idx="minor"/>
+    </dgm:style>
+  </dgm:styleLbl>
+  <dgm:styleLbl name="parChTrans1D4">
+    <dgm:scene3d>
+      <a:camera prst="orthographicFront"/>
+      <a:lightRig rig="threePt" dir="t"/>
+    </dgm:scene3d>
+    <dgm:sp3d/>
+    <dgm:txPr/>
+    <dgm:style>
+      <a:lnRef idx="2">
+        <a:scrgbClr r="0" g="0" b="0"/>
+      </a:lnRef>
+      <a:fillRef idx="0">
+        <a:scrgbClr r="0" g="0" b="0"/>
+      </a:fillRef>
+      <a:effectRef idx="0">
+        <a:scrgbClr r="0" g="0" b="0"/>
+      </a:effectRef>
+      <a:fontRef idx="minor"/>
+    </dgm:style>
+  </dgm:styleLbl>
+  <dgm:styleLbl name="fgAcc1">
+    <dgm:scene3d>
+      <a:camera prst="orthographicFront"/>
+      <a:lightRig rig="threePt" dir="t"/>
+    </dgm:scene3d>
+    <dgm:sp3d/>
+    <dgm:txPr/>
+    <dgm:style>
+      <a:lnRef idx="2">
+        <a:scrgbClr r="0" g="0" b="0"/>
+      </a:lnRef>
+      <a:fillRef idx="1">
+        <a:scrgbClr r="0" g="0" b="0"/>
+      </a:fillRef>
+      <a:effectRef idx="0">
+        <a:scrgbClr r="0" g="0" b="0"/>
+      </a:effectRef>
+      <a:fontRef idx="minor"/>
+    </dgm:style>
+  </dgm:styleLbl>
+  <dgm:styleLbl name="conFgAcc1">
+    <dgm:scene3d>
+      <a:camera prst="orthographicFront"/>
+      <a:lightRig rig="threePt" dir="t"/>
+    </dgm:scene3d>
+    <dgm:sp3d/>
+    <dgm:txPr/>
+    <dgm:style>
+      <a:lnRef idx="2">
+        <a:scrgbClr r="0" g="0" b="0"/>
+      </a:lnRef>
+      <a:fillRef idx="1">
+        <a:scrgbClr r="0" g="0" b="0"/>
+      </a:fillRef>
+      <a:effectRef idx="0">
+        <a:scrgbClr r="0" g="0" b="0"/>
+      </a:effectRef>
+      <a:fontRef idx="minor"/>
+    </dgm:style>
+  </dgm:styleLbl>
+  <dgm:styleLbl name="alignAcc1">
+    <dgm:scene3d>
+      <a:camera prst="orthographicFront"/>
+      <a:lightRig rig="threePt" dir="t"/>
+    </dgm:scene3d>
+    <dgm:sp3d/>
+    <dgm:txPr/>
+    <dgm:style>
+      <a:lnRef idx="2">
+        <a:scrgbClr r="0" g="0" b="0"/>
+      </a:lnRef>
+      <a:fillRef idx="1">
+        <a:scrgbClr r="0" g="0" b="0"/>
+      </a:fillRef>
+      <a:effectRef idx="0">
+        <a:scrgbClr r="0" g="0" b="0"/>
+      </a:effectRef>
+      <a:fontRef idx="minor"/>
+    </dgm:style>
+  </dgm:styleLbl>
+  <dgm:styleLbl name="trAlignAcc1">
+    <dgm:scene3d>
+      <a:camera prst="orthographicFront"/>
+      <a:lightRig rig="threePt" dir="t"/>
+    </dgm:scene3d>
+    <dgm:sp3d/>
+    <dgm:txPr/>
+    <dgm:style>
+      <a:lnRef idx="1">
+        <a:scrgbClr r="0" g="0" b="0"/>
+      </a:lnRef>
+      <a:fillRef idx="1">
+        <a:scrgbClr r="0" g="0" b="0"/>
+      </a:fillRef>
+      <a:effectRef idx="0">
+        <a:scrgbClr r="0" g="0" b="0"/>
+      </a:effectRef>
+      <a:fontRef idx="minor"/>
+    </dgm:style>
+  </dgm:styleLbl>
+  <dgm:styleLbl name="bgAcc1">
+    <dgm:scene3d>
+      <a:camera prst="orthographicFront"/>
+      <a:lightRig rig="threePt" dir="t"/>
+    </dgm:scene3d>
+    <dgm:sp3d/>
+    <dgm:txPr/>
+    <dgm:style>
+      <a:lnRef idx="2">
+        <a:scrgbClr r="0" g="0" b="0"/>
+      </a:lnRef>
+      <a:fillRef idx="1">
+        <a:scrgbClr r="0" g="0" b="0"/>
+      </a:fillRef>
+      <a:effectRef idx="0">
+        <a:scrgbClr r="0" g="0" b="0"/>
+      </a:effectRef>
+      <a:fontRef idx="minor"/>
+    </dgm:style>
+  </dgm:styleLbl>
+  <dgm:styleLbl name="solidFgAcc1">
+    <dgm:scene3d>
+      <a:camera prst="orthographicFront"/>
+      <a:lightRig rig="threePt" dir="t"/>
+    </dgm:scene3d>
+    <dgm:sp3d/>
+    <dgm:txPr/>
+    <dgm:style>
+      <a:lnRef idx="2">
+        <a:scrgbClr r="0" g="0" b="0"/>
+      </a:lnRef>
+      <a:fillRef idx="1">
+        <a:scrgbClr r="0" g="0" b="0"/>
+      </a:fillRef>
+      <a:effectRef idx="0">
+        <a:scrgbClr r="0" g="0" b="0"/>
+      </a:effectRef>
+      <a:fontRef idx="minor"/>
+    </dgm:style>
+  </dgm:styleLbl>
+  <dgm:styleLbl name="solidAlignAcc1">
+    <dgm:scene3d>
+      <a:camera prst="orthographicFront"/>
+      <a:lightRig rig="threePt" dir="t"/>
+    </dgm:scene3d>
+    <dgm:sp3d/>
+    <dgm:txPr/>
+    <dgm:style>
+      <a:lnRef idx="2">
+        <a:scrgbClr r="0" g="0" b="0"/>
+      </a:lnRef>
+      <a:fillRef idx="1">
+        <a:scrgbClr r="0" g="0" b="0"/>
+      </a:fillRef>
+      <a:effectRef idx="0">
+        <a:scrgbClr r="0" g="0" b="0"/>
+      </a:effectRef>
+      <a:fontRef idx="minor"/>
+    </dgm:style>
+  </dgm:styleLbl>
+  <dgm:styleLbl name="solidBgAcc1">
+    <dgm:scene3d>
+      <a:camera prst="orthographicFront"/>
+      <a:lightRig rig="threePt" dir="t"/>
+    </dgm:scene3d>
+    <dgm:sp3d/>
+    <dgm:txPr/>
+    <dgm:style>
+      <a:lnRef idx="2">
+        <a:scrgbClr r="0" g="0" b="0"/>
+      </a:lnRef>
+      <a:fillRef idx="1">
+        <a:scrgbClr r="0" g="0" b="0"/>
+      </a:fillRef>
+      <a:effectRef idx="0">
+        <a:scrgbClr r="0" g="0" b="0"/>
+      </a:effectRef>
+      <a:fontRef idx="minor"/>
+    </dgm:style>
+  </dgm:styleLbl>
+  <dgm:styleLbl name="fgAccFollowNode1">
+    <dgm:scene3d>
+      <a:camera prst="orthographicFront"/>
+      <a:lightRig rig="threePt" dir="t"/>
+    </dgm:scene3d>
+    <dgm:sp3d/>
+    <dgm:txPr/>
+    <dgm:style>
+      <a:lnRef idx="2">
+        <a:scrgbClr r="0" g="0" b="0"/>
+      </a:lnRef>
+      <a:fillRef idx="1">
+        <a:scrgbClr r="0" g="0" b="0"/>
+      </a:fillRef>
+      <a:effectRef idx="0">
+        <a:scrgbClr r="0" g="0" b="0"/>
+      </a:effectRef>
+      <a:fontRef idx="minor"/>
+    </dgm:style>
+  </dgm:styleLbl>
+  <dgm:styleLbl name="alignAccFollowNode1">
+    <dgm:scene3d>
+      <a:camera prst="orthographicFront"/>
+      <a:lightRig rig="threePt" dir="t"/>
+    </dgm:scene3d>
+    <dgm:sp3d/>
+    <dgm:txPr/>
+    <dgm:style>
+      <a:lnRef idx="2">
+        <a:scrgbClr r="0" g="0" b="0"/>
+      </a:lnRef>
+      <a:fillRef idx="1">
+        <a:scrgbClr r="0" g="0" b="0"/>
+      </a:fillRef>
+      <a:effectRef idx="0">
+        <a:scrgbClr r="0" g="0" b="0"/>
+      </a:effectRef>
+      <a:fontRef idx="minor"/>
+    </dgm:style>
+  </dgm:styleLbl>
+  <dgm:styleLbl name="bgAccFollowNode1">
+    <dgm:scene3d>
+      <a:camera prst="orthographicFront"/>
+      <a:lightRig rig="threePt" dir="t"/>
+    </dgm:scene3d>
+    <dgm:sp3d/>
+    <dgm:txPr/>
+    <dgm:style>
+      <a:lnRef idx="2">
+        <a:scrgbClr r="0" g="0" b="0"/>
+      </a:lnRef>
+      <a:fillRef idx="1">
+        <a:scrgbClr r="0" g="0" b="0"/>
+      </a:fillRef>
+      <a:effectRef idx="0">
+        <a:scrgbClr r="0" g="0" b="0"/>
+      </a:effectRef>
+      <a:fontRef idx="minor"/>
+    </dgm:style>
+  </dgm:styleLbl>
+  <dgm:styleLbl name="fgAcc0">
+    <dgm:scene3d>
+      <a:camera prst="orthographicFront"/>
+      <a:lightRig rig="threePt" dir="t"/>
+    </dgm:scene3d>
+    <dgm:sp3d/>
+    <dgm:txPr/>
+    <dgm:style>
+      <a:lnRef idx="2">
+        <a:scrgbClr r="0" g="0" b="0"/>
+      </a:lnRef>
+      <a:fillRef idx="1">
+        <a:scrgbClr r="0" g="0" b="0"/>
+      </a:fillRef>
+      <a:effectRef idx="0">
+        <a:scrgbClr r="0" g="0" b="0"/>
+      </a:effectRef>
+      <a:fontRef idx="minor"/>
+    </dgm:style>
+  </dgm:styleLbl>
+  <dgm:styleLbl name="fgAcc2">
+    <dgm:scene3d>
+      <a:camera prst="orthographicFront"/>
+      <a:lightRig rig="threePt" dir="t"/>
+    </dgm:scene3d>
+    <dgm:sp3d/>
+    <dgm:txPr/>
+    <dgm:style>
+      <a:lnRef idx="2">
+        <a:scrgbClr r="0" g="0" b="0"/>
+      </a:lnRef>
+      <a:fillRef idx="1">
+        <a:scrgbClr r="0" g="0" b="0"/>
+      </a:fillRef>
+      <a:effectRef idx="0">
+        <a:scrgbClr r="0" g="0" b="0"/>
+      </a:effectRef>
+      <a:fontRef idx="minor"/>
+    </dgm:style>
+  </dgm:styleLbl>
+  <dgm:styleLbl name="fgAcc3">
+    <dgm:scene3d>
+      <a:camera prst="orthographicFront"/>
+      <a:lightRig rig="threePt" dir="t"/>
+    </dgm:scene3d>
+    <dgm:sp3d/>
+    <dgm:txPr/>
+    <dgm:style>
+      <a:lnRef idx="2">
+        <a:scrgbClr r="0" g="0" b="0"/>
+      </a:lnRef>
+      <a:fillRef idx="1">
+        <a:scrgbClr r="0" g="0" b="0"/>
+      </a:fillRef>
+      <a:effectRef idx="0">
+        <a:scrgbClr r="0" g="0" b="0"/>
+      </a:effectRef>
+      <a:fontRef idx="minor"/>
+    </dgm:style>
+  </dgm:styleLbl>
+  <dgm:styleLbl name="fgAcc4">
+    <dgm:scene3d>
+      <a:camera prst="orthographicFront"/>
+      <a:lightRig rig="threePt" dir="t"/>
+    </dgm:scene3d>
+    <dgm:sp3d/>
+    <dgm:txPr/>
+    <dgm:style>
+      <a:lnRef idx="2">
+        <a:scrgbClr r="0" g="0" b="0"/>
+      </a:lnRef>
+      <a:fillRef idx="1">
+        <a:scrgbClr r="0" g="0" b="0"/>
+      </a:fillRef>
+      <a:effectRef idx="0">
+        <a:scrgbClr r="0" g="0" b="0"/>
+      </a:effectRef>
+      <a:fontRef idx="minor"/>
+    </dgm:style>
+  </dgm:styleLbl>
+  <dgm:styleLbl name="bgShp">
+    <dgm:scene3d>
+      <a:camera prst="orthographicFront"/>
+      <a:lightRig rig="threePt" dir="t"/>
+    </dgm:scene3d>
+    <dgm:sp3d/>
+    <dgm:txPr/>
+    <dgm:style>
+      <a:lnRef idx="0">
+        <a:scrgbClr r="0" g="0" b="0"/>
+      </a:lnRef>
+      <a:fillRef idx="1">
+        <a:scrgbClr r="0" g="0" b="0"/>
+      </a:fillRef>
+      <a:effectRef idx="0">
+        <a:scrgbClr r="0" g="0" b="0"/>
+      </a:effectRef>
+      <a:fontRef idx="minor"/>
+    </dgm:style>
+  </dgm:styleLbl>
+  <dgm:styleLbl name="dkBgShp">
+    <dgm:scene3d>
+      <a:camera prst="orthographicFront"/>
+      <a:lightRig rig="threePt" dir="t"/>
+    </dgm:scene3d>
+    <dgm:sp3d/>
+    <dgm:txPr/>
+    <dgm:style>
+      <a:lnRef idx="0">
+        <a:scrgbClr r="0" g="0" b="0"/>
+      </a:lnRef>
+      <a:fillRef idx="1">
+        <a:scrgbClr r="0" g="0" b="0"/>
+      </a:fillRef>
+      <a:effectRef idx="0">
+        <a:scrgbClr r="0" g="0" b="0"/>
+      </a:effectRef>
+      <a:fontRef idx="minor"/>
+    </dgm:style>
+  </dgm:styleLbl>
+  <dgm:styleLbl name="trBgShp">
+    <dgm:scene3d>
+      <a:camera prst="orthographicFront"/>
+      <a:lightRig rig="threePt" dir="t"/>
+    </dgm:scene3d>
+    <dgm:sp3d/>
+    <dgm:txPr/>
+    <dgm:style>
+      <a:lnRef idx="0">
+        <a:scrgbClr r="0" g="0" b="0"/>
+      </a:lnRef>
+      <a:fillRef idx="1">
+        <a:scrgbClr r="0" g="0" b="0"/>
+      </a:fillRef>
+      <a:effectRef idx="0">
+        <a:scrgbClr r="0" g="0" b="0"/>
+      </a:effectRef>
+      <a:fontRef idx="minor"/>
+    </dgm:style>
+  </dgm:styleLbl>
+  <dgm:styleLbl name="fgShp">
+    <dgm:scene3d>
+      <a:camera prst="orthographicFront"/>
+      <a:lightRig rig="threePt" dir="t"/>
+    </dgm:scene3d>
+    <dgm:sp3d/>
+    <dgm:txPr/>
+    <dgm:style>
+      <a:lnRef idx="2">
+        <a:scrgbClr r="0" g="0" b="0"/>
+      </a:lnRef>
+      <a:fillRef idx="1">
+        <a:scrgbClr r="0" g="0" b="0"/>
+      </a:fillRef>
+      <a:effectRef idx="0">
+        <a:scrgbClr r="0" g="0" b="0"/>
+      </a:effectRef>
+      <a:fontRef idx="minor"/>
+    </dgm:style>
+  </dgm:styleLbl>
+  <dgm:styleLbl name="revTx">
+    <dgm:scene3d>
+      <a:camera prst="orthographicFront"/>
+      <a:lightRig rig="threePt" dir="t"/>
+    </dgm:scene3d>
+    <dgm:sp3d/>
+    <dgm:txPr/>
+    <dgm:style>
+      <a:lnRef idx="0">
+        <a:scrgbClr r="0" g="0" b="0"/>
+      </a:lnRef>
+      <a:fillRef idx="0">
+        <a:scrgbClr r="0" g="0" b="0"/>
+      </a:fillRef>
+      <a:effectRef idx="0">
+        <a:scrgbClr r="0" g="0" b="0"/>
+      </a:effectRef>
+      <a:fontRef idx="minor"/>
+    </dgm:style>
+  </dgm:styleLbl>
+</dgm:styleDef>
+</file>
+
+<file path=ppt/diagrams/quickStyle4.xml><?xml version="1.0" encoding="utf-8"?>
 <dgm:styleDef xmlns:dgm="http://schemas.openxmlformats.org/drawingml/2006/diagram" xmlns:a="http://schemas.openxmlformats.org/drawingml/2006/main" uniqueId="urn:microsoft.com/office/officeart/2005/8/quickstyle/simple1">
   <dgm:title val=""/>
   <dgm:desc val=""/>
@@ -14393,31 +17610,6 @@
           </a:p>
         </p:txBody>
       </p:sp>
-      <p:sp>
-        <p:nvSpPr>
-          <p:cNvPr id="5" name="Subtítulo 4">
-            <a:extLst>
-              <a:ext uri="{FF2B5EF4-FFF2-40B4-BE49-F238E27FC236}">
-                <a16:creationId xmlns:a16="http://schemas.microsoft.com/office/drawing/2014/main" id="{5172DD45-1C6F-8F0C-459C-4CDBFE81717F}"/>
-              </a:ext>
-            </a:extLst>
-          </p:cNvPr>
-          <p:cNvSpPr>
-            <a:spLocks noGrp="1"/>
-          </p:cNvSpPr>
-          <p:nvPr>
-            <p:ph type="subTitle" idx="1"/>
-          </p:nvPr>
-        </p:nvSpPr>
-        <p:spPr/>
-        <p:txBody>
-          <a:bodyPr/>
-          <a:lstStyle/>
-          <a:p>
-            <a:endParaRPr lang="pt-BR"/>
-          </a:p>
-        </p:txBody>
-      </p:sp>
     </p:spTree>
     <p:extLst>
       <p:ext uri="{BB962C8B-B14F-4D97-AF65-F5344CB8AC3E}">
@@ -14972,7 +18164,18 @@
           <p:nvPr/>
         </p:nvPicPr>
         <p:blipFill>
-          <a:blip r:embed="rId2"/>
+          <a:blip r:embed="rId2">
+            <a:clrChange>
+              <a:clrFrom>
+                <a:srgbClr val="FFFFFF"/>
+              </a:clrFrom>
+              <a:clrTo>
+                <a:srgbClr val="FFFFFF">
+                  <a:alpha val="0"/>
+                </a:srgbClr>
+              </a:clrTo>
+            </a:clrChange>
+          </a:blip>
           <a:stretch>
             <a:fillRect/>
           </a:stretch>
@@ -15067,31 +18270,6 @@
               <a:rPr lang="pt-BR" b="1" dirty="0"/>
               <a:t> Life</a:t>
             </a:r>
-          </a:p>
-        </p:txBody>
-      </p:sp>
-      <p:sp>
-        <p:nvSpPr>
-          <p:cNvPr id="5" name="Subtítulo 4">
-            <a:extLst>
-              <a:ext uri="{FF2B5EF4-FFF2-40B4-BE49-F238E27FC236}">
-                <a16:creationId xmlns:a16="http://schemas.microsoft.com/office/drawing/2014/main" id="{3AC7B3FF-BFE7-642C-16F0-BF4A872F2EE5}"/>
-              </a:ext>
-            </a:extLst>
-          </p:cNvPr>
-          <p:cNvSpPr>
-            <a:spLocks noGrp="1"/>
-          </p:cNvSpPr>
-          <p:nvPr>
-            <p:ph type="subTitle" idx="1"/>
-          </p:nvPr>
-        </p:nvSpPr>
-        <p:spPr/>
-        <p:txBody>
-          <a:bodyPr/>
-          <a:lstStyle/>
-          <a:p>
-            <a:endParaRPr lang="pt-BR"/>
           </a:p>
         </p:txBody>
       </p:sp>
@@ -15767,6 +18945,104 @@
   <p:cSld>
     <p:spTree>
       <p:nvGrpSpPr>
+        <p:cNvPr id="1" name="">
+          <a:extLst>
+            <a:ext uri="{FF2B5EF4-FFF2-40B4-BE49-F238E27FC236}">
+              <a16:creationId xmlns:a16="http://schemas.microsoft.com/office/drawing/2014/main" id="{DCFD1A09-2953-A731-1767-D9E523A19B17}"/>
+            </a:ext>
+          </a:extLst>
+        </p:cNvPr>
+        <p:cNvGrpSpPr/>
+        <p:nvPr/>
+      </p:nvGrpSpPr>
+      <p:grpSpPr>
+        <a:xfrm>
+          <a:off x="0" y="0"/>
+          <a:ext cx="0" cy="0"/>
+          <a:chOff x="0" y="0"/>
+          <a:chExt cx="0" cy="0"/>
+        </a:xfrm>
+      </p:grpSpPr>
+      <p:sp>
+        <p:nvSpPr>
+          <p:cNvPr id="2" name="Título 1">
+            <a:extLst>
+              <a:ext uri="{FF2B5EF4-FFF2-40B4-BE49-F238E27FC236}">
+                <a16:creationId xmlns:a16="http://schemas.microsoft.com/office/drawing/2014/main" id="{C135D564-8B04-8E54-CF7E-BF2FF58EC123}"/>
+              </a:ext>
+            </a:extLst>
+          </p:cNvPr>
+          <p:cNvSpPr>
+            <a:spLocks noGrp="1"/>
+          </p:cNvSpPr>
+          <p:nvPr>
+            <p:ph type="title"/>
+          </p:nvPr>
+        </p:nvSpPr>
+        <p:spPr>
+          <a:xfrm>
+            <a:off x="322730" y="286871"/>
+            <a:ext cx="10772775" cy="848412"/>
+          </a:xfrm>
+        </p:spPr>
+        <p:txBody>
+          <a:bodyPr/>
+          <a:lstStyle/>
+          <a:p>
+            <a:r>
+              <a:rPr lang="pt-BR" b="1" dirty="0"/>
+              <a:t>Oportunidades</a:t>
+            </a:r>
+            <a:endParaRPr lang="pt-BR" dirty="0"/>
+          </a:p>
+        </p:txBody>
+      </p:sp>
+      <p:graphicFrame>
+        <p:nvGraphicFramePr>
+          <p:cNvPr id="3" name="Diagrama 2">
+            <a:extLst>
+              <a:ext uri="{FF2B5EF4-FFF2-40B4-BE49-F238E27FC236}">
+                <a16:creationId xmlns:a16="http://schemas.microsoft.com/office/drawing/2014/main" id="{90B5E03A-D6B7-CD40-D6A0-F6E3F65828E3}"/>
+              </a:ext>
+            </a:extLst>
+          </p:cNvPr>
+          <p:cNvGraphicFramePr/>
+          <p:nvPr>
+            <p:extLst>
+              <p:ext uri="{D42A27DB-BD31-4B8C-83A1-F6EECF244321}">
+                <p14:modId xmlns:p14="http://schemas.microsoft.com/office/powerpoint/2010/main" val="3690585515"/>
+              </p:ext>
+            </p:extLst>
+          </p:nvPr>
+        </p:nvGraphicFramePr>
+        <p:xfrm>
+          <a:off x="322729" y="1039907"/>
+          <a:ext cx="10614211" cy="4948518"/>
+        </p:xfrm>
+        <a:graphic>
+          <a:graphicData uri="http://schemas.openxmlformats.org/drawingml/2006/diagram">
+            <dgm:relIds xmlns:dgm="http://schemas.openxmlformats.org/drawingml/2006/diagram" xmlns:r="http://schemas.openxmlformats.org/officeDocument/2006/relationships" r:dm="rId2" r:lo="rId3" r:qs="rId4" r:cs="rId5"/>
+          </a:graphicData>
+        </a:graphic>
+      </p:graphicFrame>
+    </p:spTree>
+    <p:extLst>
+      <p:ext uri="{BB962C8B-B14F-4D97-AF65-F5344CB8AC3E}">
+        <p14:creationId xmlns:p14="http://schemas.microsoft.com/office/powerpoint/2010/main" val="61079187"/>
+      </p:ext>
+    </p:extLst>
+  </p:cSld>
+  <p:clrMapOvr>
+    <a:masterClrMapping/>
+  </p:clrMapOvr>
+</p:sld>
+</file>
+
+<file path=ppt/slides/slide16.xml><?xml version="1.0" encoding="utf-8"?>
+<p:sld xmlns:a="http://schemas.openxmlformats.org/drawingml/2006/main" xmlns:r="http://schemas.openxmlformats.org/officeDocument/2006/relationships" xmlns:p="http://schemas.openxmlformats.org/presentationml/2006/main">
+  <p:cSld>
+    <p:spTree>
+      <p:nvGrpSpPr>
         <p:cNvPr id="1" name=""/>
         <p:cNvGrpSpPr/>
         <p:nvPr/>
@@ -15897,6 +19173,147 @@
           <a:p>
             <a:pPr algn="ctr"/>
             <a:endParaRPr lang="pt-BR"/>
+          </a:p>
+        </p:txBody>
+      </p:sp>
+      <p:sp>
+        <p:nvSpPr>
+          <p:cNvPr id="6" name="CaixaDeTexto 5">
+            <a:extLst>
+              <a:ext uri="{FF2B5EF4-FFF2-40B4-BE49-F238E27FC236}">
+                <a16:creationId xmlns:a16="http://schemas.microsoft.com/office/drawing/2014/main" id="{085C05ED-D484-4656-4F0A-DEEEBA985527}"/>
+              </a:ext>
+            </a:extLst>
+          </p:cNvPr>
+          <p:cNvSpPr txBox="1"/>
+          <p:nvPr/>
+        </p:nvSpPr>
+        <p:spPr>
+          <a:xfrm>
+            <a:off x="1250397" y="3703918"/>
+            <a:ext cx="6096000" cy="369332"/>
+          </a:xfrm>
+          <a:prstGeom prst="rect">
+            <a:avLst/>
+          </a:prstGeom>
+          <a:noFill/>
+        </p:spPr>
+        <p:txBody>
+          <a:bodyPr wrap="square">
+            <a:spAutoFit/>
+          </a:bodyPr>
+          <a:lstStyle/>
+          <a:p>
+            <a:r>
+              <a:rPr lang="pt-BR" dirty="0">
+                <a:hlinkClick r:id="rId2"/>
+              </a:rPr>
+              <a:t>https://github.com/lucasrigobello/predictivemaintenance</a:t>
+            </a:r>
+            <a:endParaRPr lang="pt-BR" dirty="0"/>
+          </a:p>
+        </p:txBody>
+      </p:sp>
+      <p:pic>
+        <p:nvPicPr>
+          <p:cNvPr id="1026" name="Picture 2" descr="GitHub Logos and Usage · GitHub">
+            <a:extLst>
+              <a:ext uri="{FF2B5EF4-FFF2-40B4-BE49-F238E27FC236}">
+                <a16:creationId xmlns:a16="http://schemas.microsoft.com/office/drawing/2014/main" id="{FC82F1B8-595F-37C4-81F0-1FA424D17E63}"/>
+              </a:ext>
+            </a:extLst>
+          </p:cNvPr>
+          <p:cNvPicPr>
+            <a:picLocks noChangeAspect="1" noChangeArrowheads="1"/>
+          </p:cNvPicPr>
+          <p:nvPr/>
+        </p:nvPicPr>
+        <p:blipFill>
+          <a:blip r:embed="rId3">
+            <a:clrChange>
+              <a:clrFrom>
+                <a:srgbClr val="FFFFFF"/>
+              </a:clrFrom>
+              <a:clrTo>
+                <a:srgbClr val="FFFFFF">
+                  <a:alpha val="0"/>
+                </a:srgbClr>
+              </a:clrTo>
+            </a:clrChange>
+            <a:extLst>
+              <a:ext uri="{28A0092B-C50C-407E-A947-70E740481C1C}">
+                <a14:useLocalDpi xmlns:a14="http://schemas.microsoft.com/office/drawing/2010/main" val="0"/>
+              </a:ext>
+            </a:extLst>
+          </a:blip>
+          <a:srcRect/>
+          <a:stretch>
+            <a:fillRect/>
+          </a:stretch>
+        </p:blipFill>
+        <p:spPr bwMode="auto">
+          <a:xfrm>
+            <a:off x="676656" y="3429000"/>
+            <a:ext cx="644250" cy="644250"/>
+          </a:xfrm>
+          <a:prstGeom prst="rect">
+            <a:avLst/>
+          </a:prstGeom>
+          <a:noFill/>
+          <a:extLst>
+            <a:ext uri="{909E8E84-426E-40DD-AFC4-6F175D3DCCD1}">
+              <a14:hiddenFill xmlns:a14="http://schemas.microsoft.com/office/drawing/2010/main">
+                <a:solidFill>
+                  <a:srgbClr val="FFFFFF"/>
+                </a:solidFill>
+              </a14:hiddenFill>
+            </a:ext>
+          </a:extLst>
+        </p:spPr>
+      </p:pic>
+      <p:sp>
+        <p:nvSpPr>
+          <p:cNvPr id="7" name="CaixaDeTexto 6">
+            <a:extLst>
+              <a:ext uri="{FF2B5EF4-FFF2-40B4-BE49-F238E27FC236}">
+                <a16:creationId xmlns:a16="http://schemas.microsoft.com/office/drawing/2014/main" id="{2140CFED-7285-7B59-E161-B7516FDE598B}"/>
+              </a:ext>
+            </a:extLst>
+          </p:cNvPr>
+          <p:cNvSpPr txBox="1"/>
+          <p:nvPr/>
+        </p:nvSpPr>
+        <p:spPr>
+          <a:xfrm>
+            <a:off x="998781" y="2337768"/>
+            <a:ext cx="3976631" cy="1200329"/>
+          </a:xfrm>
+          <a:prstGeom prst="rect">
+            <a:avLst/>
+          </a:prstGeom>
+          <a:noFill/>
+        </p:spPr>
+        <p:txBody>
+          <a:bodyPr wrap="square">
+            <a:spAutoFit/>
+          </a:bodyPr>
+          <a:lstStyle/>
+          <a:p>
+            <a:r>
+              <a:rPr lang="pt-BR" dirty="0"/>
+              <a:t>Projeto desenvolvido para o Case pode ser encontrado no Github.</a:t>
+            </a:r>
+          </a:p>
+          <a:p>
+            <a:r>
+              <a:rPr lang="pt-BR" dirty="0"/>
+              <a:t>- Foi construído uma estrutura para servir os modelos criados via </a:t>
+            </a:r>
+            <a:r>
+              <a:rPr lang="pt-BR" dirty="0" err="1"/>
+              <a:t>FastAPI</a:t>
+            </a:r>
+            <a:endParaRPr lang="pt-BR" dirty="0"/>
           </a:p>
         </p:txBody>
       </p:sp>

</xml_diff>